<commit_message>
Updated Presentation and Resnet model
</commit_message>
<xml_diff>
--- a/presentation/ImageClassificationusingTransferLearning.pptx
+++ b/presentation/ImageClassificationusingTransferLearning.pptx
@@ -5,7 +5,7 @@
     <p:sldMasterId id="2147483648" r:id="rId1"/>
   </p:sldMasterIdLst>
   <p:notesMasterIdLst>
-    <p:notesMasterId r:id="rId48"/>
+    <p:notesMasterId r:id="rId50"/>
   </p:notesMasterIdLst>
   <p:sldIdLst>
     <p:sldId id="256" r:id="rId2"/>
@@ -44,16 +44,18 @@
     <p:sldId id="289" r:id="rId35"/>
     <p:sldId id="290" r:id="rId36"/>
     <p:sldId id="291" r:id="rId37"/>
-    <p:sldId id="292" r:id="rId38"/>
-    <p:sldId id="293" r:id="rId39"/>
-    <p:sldId id="294" r:id="rId40"/>
-    <p:sldId id="295" r:id="rId41"/>
-    <p:sldId id="296" r:id="rId42"/>
-    <p:sldId id="297" r:id="rId43"/>
-    <p:sldId id="298" r:id="rId44"/>
-    <p:sldId id="301" r:id="rId45"/>
-    <p:sldId id="299" r:id="rId46"/>
-    <p:sldId id="300" r:id="rId47"/>
+    <p:sldId id="302" r:id="rId38"/>
+    <p:sldId id="303" r:id="rId39"/>
+    <p:sldId id="292" r:id="rId40"/>
+    <p:sldId id="293" r:id="rId41"/>
+    <p:sldId id="294" r:id="rId42"/>
+    <p:sldId id="295" r:id="rId43"/>
+    <p:sldId id="296" r:id="rId44"/>
+    <p:sldId id="297" r:id="rId45"/>
+    <p:sldId id="298" r:id="rId46"/>
+    <p:sldId id="301" r:id="rId47"/>
+    <p:sldId id="299" r:id="rId48"/>
+    <p:sldId id="300" r:id="rId49"/>
   </p:sldIdLst>
   <p:sldSz cx="12192000" cy="6858000"/>
   <p:notesSz cx="6858000" cy="9144000"/>
@@ -3935,8 +3937,8 @@
           <a:chExt cx="0" cy="0"/>
         </a:xfrm>
       </p:grpSpPr>
-      <mc:AlternateContent xmlns:mc="http://schemas.openxmlformats.org/markup-compatibility/2006" xmlns:a14="http://schemas.microsoft.com/office/drawing/2010/main">
-        <mc:Choice Requires="a14">
+      <mc:AlternateContent xmlns:mc="http://schemas.openxmlformats.org/markup-compatibility/2006">
+        <mc:Choice xmlns:a14="http://schemas.microsoft.com/office/drawing/2010/main" Requires="a14">
           <p:sp>
             <p:nvSpPr>
               <p:cNvPr id="3" name="Content Placeholder 2">
@@ -3967,7 +3969,7 @@
               <a:p>
                 <a:r>
                   <a:rPr lang="en-US" dirty="0"/>
-                  <a:t>Notice that directions of the arrows have been reversed, as we are back propagating and assume our edge weights as gradients</a:t>
+                  <a:t>Notice that directions of the arrows have been reversed, as we are back propagating and we assume our edge weights as gradients</a:t>
                 </a:r>
               </a:p>
               <a:p>
@@ -4198,7 +4200,7 @@
             </p:txBody>
           </p:sp>
         </mc:Choice>
-        <mc:Fallback xmlns="">
+        <mc:Fallback>
           <p:sp>
             <p:nvSpPr>
               <p:cNvPr id="3" name="Content Placeholder 2">
@@ -4371,8 +4373,8 @@
           <a:chExt cx="0" cy="0"/>
         </a:xfrm>
       </p:grpSpPr>
-      <mc:AlternateContent xmlns:mc="http://schemas.openxmlformats.org/markup-compatibility/2006" xmlns:a14="http://schemas.microsoft.com/office/drawing/2010/main">
-        <mc:Choice Requires="a14">
+      <mc:AlternateContent xmlns:mc="http://schemas.openxmlformats.org/markup-compatibility/2006">
+        <mc:Choice xmlns:a14="http://schemas.microsoft.com/office/drawing/2010/main" Requires="a14">
           <p:sp>
             <p:nvSpPr>
               <p:cNvPr id="3" name="Content Placeholder 2">
@@ -4401,7 +4403,7 @@
               <a:p>
                 <a:r>
                   <a:rPr lang="en-GB" dirty="0"/>
-                  <a:t>Now that we have got our gradients, we can update our weights using SGD or whatever optimization algorithm you like</a:t>
+                  <a:t>Now that we have got our gradients, we can update our weights using SGD or whatever optimization algorithm we choose for</a:t>
                 </a:r>
               </a:p>
               <a:p>
@@ -4517,20 +4519,24 @@
                 </a:r>
                 <a:r>
                   <a:rPr lang="en-IN" dirty="0"/>
-                  <a:t>y default only the gradients of the leaf nodes are saved and gradients of non-leaf nodes are destroyed</a:t>
+                  <a:t>y default, only the gradients of the leaf nodes are saved and gradients of non-leaf nodes are destroyed</a:t>
                 </a:r>
               </a:p>
               <a:p>
                 <a:r>
                   <a:rPr lang="en-US" dirty="0"/>
-                  <a:t>More information on this in later slides</a:t>
+                  <a:t>More information on this in comparison slides of TensorFlow and </a:t>
+                </a:r>
+                <a:r>
+                  <a:rPr lang="en-US" dirty="0" err="1"/>
+                  <a:t>PyTorch</a:t>
                 </a:r>
                 <a:endParaRPr lang="en-IN" dirty="0"/>
               </a:p>
             </p:txBody>
           </p:sp>
         </mc:Choice>
-        <mc:Fallback xmlns="">
+        <mc:Fallback>
           <p:sp>
             <p:nvSpPr>
               <p:cNvPr id="3" name="Content Placeholder 2">
@@ -4676,7 +4682,7 @@
           <a:p>
             <a:r>
               <a:rPr lang="en-GB" dirty="0"/>
-              <a:t>If the learning rate is too small, then training will take very long time to get to the bottom</a:t>
+              <a:t>If the learning rate is too small, then training will take very long time to get to the optimum</a:t>
             </a:r>
           </a:p>
           <a:p>
@@ -4894,7 +4900,7 @@
           <a:p>
             <a:r>
               <a:rPr lang="en-GB" dirty="0"/>
-              <a:t>We need to select a point on the graph with the fastest decrease in the loss. </a:t>
+              <a:t>We need to select a point on the graph with the fastest descent in the loss. </a:t>
             </a:r>
           </a:p>
           <a:p>
@@ -4914,7 +4920,7 @@
             </a:r>
             <a:r>
               <a:rPr lang="en-US" dirty="0"/>
-              <a:t>() that gives an best learning rate to start with</a:t>
+              <a:t>() that gives best learning rate to start with</a:t>
             </a:r>
           </a:p>
           <a:p>
@@ -4924,7 +4930,7 @@
             </a:r>
             <a:r>
               <a:rPr lang="en-GB" dirty="0"/>
-              <a:t> run the training with increasing the learning rate after each epoch by multiplying it by a small constant. </a:t>
+              <a:t> run the training with increasing the learning rate after each epoch achieved by multiplying it by a small constant. </a:t>
             </a:r>
           </a:p>
           <a:p>
@@ -5825,7 +5831,7 @@
           <a:p>
             <a:r>
               <a:rPr lang="en-GB" dirty="0"/>
-              <a:t>Combines a dataset and a sampler, and provides single- or multi-process iterators over the dataset.</a:t>
+              <a:t>Combines a dataset and a sampler, and provides single or multi-process iterators over the dataset.</a:t>
             </a:r>
           </a:p>
           <a:p>
@@ -5852,7 +5858,10 @@
               <a:rPr lang="en-GB" dirty="0" err="1"/>
               <a:t>num_workers</a:t>
             </a:r>
-            <a:endParaRPr lang="en-GB" dirty="0"/>
+            <a:r>
+              <a:rPr lang="en-GB" dirty="0"/>
+              <a:t> is the attribute</a:t>
+            </a:r>
           </a:p>
           <a:p>
             <a:pPr marL="457200" lvl="1" indent="0">
@@ -5863,7 +5872,7 @@
           <a:p>
             <a:r>
               <a:rPr lang="en-GB" dirty="0"/>
-              <a:t>A Custom function defined to load different phases </a:t>
+              <a:t>Defined a Custom function to load different phases </a:t>
             </a:r>
             <a:r>
               <a:rPr lang="en-US" dirty="0"/>
@@ -5960,7 +5969,9 @@
           </a:xfrm>
         </p:spPr>
         <p:txBody>
-          <a:bodyPr/>
+          <a:bodyPr>
+            <a:normAutofit lnSpcReduction="10000"/>
+          </a:bodyPr>
           <a:lstStyle/>
           <a:p>
             <a:r>
@@ -5991,7 +6002,7 @@
             </a:r>
             <a:r>
               <a:rPr lang="en-GB" dirty="0"/>
-              <a:t> are common image augmentation techniques in </a:t>
+              <a:t> provide common image augmentation techniques in </a:t>
             </a:r>
             <a:r>
               <a:rPr lang="en-GB" dirty="0" err="1"/>
@@ -6044,8 +6055,8 @@
           <a:chExt cx="0" cy="0"/>
         </a:xfrm>
       </p:grpSpPr>
-      <mc:AlternateContent xmlns:mc="http://schemas.openxmlformats.org/markup-compatibility/2006" xmlns:a14="http://schemas.microsoft.com/office/drawing/2010/main">
-        <mc:Choice Requires="a14">
+      <mc:AlternateContent xmlns:mc="http://schemas.openxmlformats.org/markup-compatibility/2006">
+        <mc:Choice xmlns:a14="http://schemas.microsoft.com/office/drawing/2010/main" Requires="a14">
           <p:sp>
             <p:nvSpPr>
               <p:cNvPr id="3" name="Content Placeholder 2">
@@ -6210,14 +6221,14 @@
               <a:p>
                 <a:r>
                   <a:rPr lang="en-GB" dirty="0"/>
-                  <a:t>Normalization helps get data within a range and reduces the skewness which helps learn faster and better</a:t>
+                  <a:t>Normalization helps to get data within a range and reduces the skewness which helps learn faster and better</a:t>
                 </a:r>
                 <a:endParaRPr lang="en-US" dirty="0"/>
               </a:p>
             </p:txBody>
           </p:sp>
         </mc:Choice>
-        <mc:Fallback xmlns="">
+        <mc:Fallback>
           <p:sp>
             <p:nvSpPr>
               <p:cNvPr id="3" name="Content Placeholder 2">
@@ -7036,7 +7047,7 @@
           <a:p>
             <a:r>
               <a:rPr lang="en-US" dirty="0"/>
-              <a:t>Step2: A Custom function to that achieves stepwise annealing</a:t>
+              <a:t>Step2: A Custom function that achieves stepwise annealing</a:t>
             </a:r>
           </a:p>
           <a:p>
@@ -7348,7 +7359,7 @@
             </a:r>
             <a:r>
               <a:rPr lang="en-US" dirty="0"/>
-              <a:t> is Python-based scientific computing package that is a replacement for NumPy, and uses the power of GPU’s</a:t>
+              <a:t> is a Python-based scientific computing package that is a replacement for NumPy, and uses the power of GPU’s</a:t>
             </a:r>
           </a:p>
           <a:p>
@@ -7401,7 +7412,7 @@
             </a:r>
             <a:r>
               <a:rPr lang="en-US" dirty="0"/>
-              <a:t> is an automatic differentiation library that supports all differentiable Tensor operations in torch</a:t>
+              <a:t> is an automatic differentiation library that supports all differentiable tensor operations in torch</a:t>
             </a:r>
           </a:p>
           <a:p>
@@ -7742,7 +7753,7 @@
           <a:p>
             <a:r>
               <a:rPr lang="en-US" dirty="0"/>
-              <a:t>All models have basic requirement of image input size and has 1000 classes as output classes under the Linear or Fully Connected component of the model</a:t>
+              <a:t>All models have basic requirement of specific image input size and has 1000 classes as output classes under the Linear or Fully Connected component of the model</a:t>
             </a:r>
           </a:p>
           <a:p>
@@ -7870,7 +7881,15 @@
             </a:r>
             <a:r>
               <a:rPr lang="en-US" dirty="0"/>
-              <a:t>, instead of sigmoid or tanh, there by solving the vanishing gradient problem.</a:t>
+              <a:t>, instead of sigmoid or tanh, there by solving the </a:t>
+            </a:r>
+            <a:r>
+              <a:rPr lang="en-US" b="1" dirty="0"/>
+              <a:t>vanishing gradient</a:t>
+            </a:r>
+            <a:r>
+              <a:rPr lang="en-US" dirty="0"/>
+              <a:t> problem.</a:t>
             </a:r>
           </a:p>
           <a:p>
@@ -8438,32 +8457,107 @@
         </p:nvSpPr>
         <p:spPr>
           <a:xfrm>
-            <a:off x="838200" y="314325"/>
-            <a:ext cx="10515600" cy="1087755"/>
+            <a:off x="839788" y="314325"/>
+            <a:ext cx="10515600" cy="681355"/>
           </a:xfrm>
         </p:spPr>
         <p:txBody>
+          <a:bodyPr>
+            <a:normAutofit fontScale="90000"/>
+          </a:bodyPr>
+          <a:lstStyle/>
+          <a:p>
+            <a:r>
+              <a:rPr lang="en-US" dirty="0"/>
+              <a:t>Comparison of different </a:t>
+            </a:r>
+            <a:r>
+              <a:rPr lang="en-US" dirty="0" err="1"/>
+              <a:t>ConvNets</a:t>
+            </a:r>
+            <a:r>
+              <a:rPr lang="en-US" dirty="0"/>
+              <a:t> – Train Loss </a:t>
+            </a:r>
+            <a:endParaRPr lang="en-IN" dirty="0"/>
+          </a:p>
+        </p:txBody>
+      </p:sp>
+      <p:sp>
+        <p:nvSpPr>
+          <p:cNvPr id="4" name="Text Placeholder 3">
+            <a:extLst>
+              <a:ext uri="{FF2B5EF4-FFF2-40B4-BE49-F238E27FC236}">
+                <a16:creationId xmlns:a16="http://schemas.microsoft.com/office/drawing/2014/main" id="{34C62AD5-1DE4-43BD-9E53-23546D002C46}"/>
+              </a:ext>
+            </a:extLst>
+          </p:cNvPr>
+          <p:cNvSpPr>
+            <a:spLocks noGrp="1"/>
+          </p:cNvSpPr>
+          <p:nvPr>
+            <p:ph type="body" idx="1"/>
+          </p:nvPr>
+        </p:nvSpPr>
+        <p:spPr>
+          <a:xfrm>
+            <a:off x="6200986" y="4001698"/>
+            <a:ext cx="5157787" cy="421957"/>
+          </a:xfrm>
+        </p:spPr>
+        <p:txBody>
           <a:bodyPr/>
           <a:lstStyle/>
           <a:p>
             <a:r>
               <a:rPr lang="en-US" dirty="0"/>
-              <a:t>Comparison of different </a:t>
-            </a:r>
-            <a:r>
-              <a:rPr lang="en-US" dirty="0" err="1"/>
-              <a:t>ConvNets</a:t>
+              <a:t>VGG16</a:t>
             </a:r>
             <a:endParaRPr lang="en-IN" dirty="0"/>
           </a:p>
         </p:txBody>
       </p:sp>
-      <p:sp>
-        <p:nvSpPr>
-          <p:cNvPr id="3" name="Content Placeholder 2">
-            <a:extLst>
-              <a:ext uri="{FF2B5EF4-FFF2-40B4-BE49-F238E27FC236}">
-                <a16:creationId xmlns:a16="http://schemas.microsoft.com/office/drawing/2014/main" id="{5E4FB288-2956-46F4-8802-7E3F5640408B}"/>
+      <p:pic>
+        <p:nvPicPr>
+          <p:cNvPr id="9" name="Content Placeholder 8">
+            <a:extLst>
+              <a:ext uri="{FF2B5EF4-FFF2-40B4-BE49-F238E27FC236}">
+                <a16:creationId xmlns:a16="http://schemas.microsoft.com/office/drawing/2014/main" id="{5F8AF5D6-9238-45A1-880F-0080A61DCC42}"/>
+              </a:ext>
+            </a:extLst>
+          </p:cNvPr>
+          <p:cNvPicPr>
+            <a:picLocks noGrp="1" noChangeAspect="1"/>
+          </p:cNvPicPr>
+          <p:nvPr>
+            <p:ph sz="half" idx="2"/>
+          </p:nvPr>
+        </p:nvPicPr>
+        <p:blipFill>
+          <a:blip r:embed="rId2">
+            <a:extLst>
+              <a:ext uri="{28A0092B-C50C-407E-A947-70E740481C1C}">
+                <a14:useLocalDpi xmlns:a14="http://schemas.microsoft.com/office/drawing/2010/main" val="0"/>
+              </a:ext>
+            </a:extLst>
+          </a:blip>
+          <a:stretch>
+            <a:fillRect/>
+          </a:stretch>
+        </p:blipFill>
+        <p:spPr>
+          <a:xfrm>
+            <a:off x="555308" y="1547477"/>
+            <a:ext cx="4626291" cy="2188140"/>
+          </a:xfrm>
+        </p:spPr>
+      </p:pic>
+      <p:sp>
+        <p:nvSpPr>
+          <p:cNvPr id="6" name="Text Placeholder 5">
+            <a:extLst>
+              <a:ext uri="{FF2B5EF4-FFF2-40B4-BE49-F238E27FC236}">
+                <a16:creationId xmlns:a16="http://schemas.microsoft.com/office/drawing/2014/main" id="{43C19EE0-7E31-4906-93F1-6FCC65170A73}"/>
               </a:ext>
             </a:extLst>
           </p:cNvPr>
@@ -8471,23 +8565,534 @@
             <a:spLocks noGrp="1"/>
           </p:cNvSpPr>
           <p:nvPr>
-            <p:ph idx="1"/>
+            <p:ph type="body" sz="quarter" idx="3"/>
           </p:nvPr>
         </p:nvSpPr>
         <p:spPr>
           <a:xfrm>
-            <a:off x="838200" y="1452880"/>
-            <a:ext cx="10515600" cy="4724083"/>
+            <a:off x="6172200" y="1193641"/>
+            <a:ext cx="5183188" cy="421957"/>
           </a:xfrm>
         </p:spPr>
         <p:txBody>
           <a:bodyPr/>
           <a:lstStyle/>
           <a:p>
+            <a:r>
+              <a:rPr lang="en-US" dirty="0" err="1"/>
+              <a:t>SqueezeNet</a:t>
+            </a:r>
             <a:endParaRPr lang="en-IN" dirty="0"/>
           </a:p>
         </p:txBody>
       </p:sp>
+      <p:pic>
+        <p:nvPicPr>
+          <p:cNvPr id="11" name="Content Placeholder 10">
+            <a:extLst>
+              <a:ext uri="{FF2B5EF4-FFF2-40B4-BE49-F238E27FC236}">
+                <a16:creationId xmlns:a16="http://schemas.microsoft.com/office/drawing/2014/main" id="{2F158DD8-5AB1-4A98-98CD-CC11DCFCD28C}"/>
+              </a:ext>
+            </a:extLst>
+          </p:cNvPr>
+          <p:cNvPicPr>
+            <a:picLocks noGrp="1" noChangeAspect="1"/>
+          </p:cNvPicPr>
+          <p:nvPr>
+            <p:ph sz="quarter" idx="4"/>
+          </p:nvPr>
+        </p:nvPicPr>
+        <p:blipFill>
+          <a:blip r:embed="rId3">
+            <a:extLst>
+              <a:ext uri="{28A0092B-C50C-407E-A947-70E740481C1C}">
+                <a14:useLocalDpi xmlns:a14="http://schemas.microsoft.com/office/drawing/2010/main" val="0"/>
+              </a:ext>
+            </a:extLst>
+          </a:blip>
+          <a:stretch>
+            <a:fillRect/>
+          </a:stretch>
+        </p:blipFill>
+        <p:spPr>
+          <a:xfrm>
+            <a:off x="6200986" y="1615598"/>
+            <a:ext cx="4626291" cy="2120019"/>
+          </a:xfrm>
+        </p:spPr>
+      </p:pic>
+      <p:sp>
+        <p:nvSpPr>
+          <p:cNvPr id="12" name="Text Placeholder 3">
+            <a:extLst>
+              <a:ext uri="{FF2B5EF4-FFF2-40B4-BE49-F238E27FC236}">
+                <a16:creationId xmlns:a16="http://schemas.microsoft.com/office/drawing/2014/main" id="{E64ECE65-4A1A-427C-A79C-B1A070D3C360}"/>
+              </a:ext>
+            </a:extLst>
+          </p:cNvPr>
+          <p:cNvSpPr txBox="1">
+            <a:spLocks/>
+          </p:cNvSpPr>
+          <p:nvPr/>
+        </p:nvSpPr>
+        <p:spPr>
+          <a:xfrm>
+            <a:off x="1043199" y="1193641"/>
+            <a:ext cx="5157787" cy="421957"/>
+          </a:xfrm>
+          <a:prstGeom prst="rect">
+            <a:avLst/>
+          </a:prstGeom>
+        </p:spPr>
+        <p:txBody>
+          <a:bodyPr vert="horz" lIns="91440" tIns="45720" rIns="91440" bIns="45720" rtlCol="0" anchor="b">
+            <a:normAutofit/>
+          </a:bodyPr>
+          <a:lstStyle>
+            <a:lvl1pPr marL="0" indent="0" algn="l" defTabSz="914400" rtl="0" eaLnBrk="1" latinLnBrk="0" hangingPunct="1">
+              <a:lnSpc>
+                <a:spcPct val="90000"/>
+              </a:lnSpc>
+              <a:spcBef>
+                <a:spcPts val="1000"/>
+              </a:spcBef>
+              <a:buFont typeface="Arial" panose="020B0604020202020204" pitchFamily="34" charset="0"/>
+              <a:buNone/>
+              <a:defRPr sz="2400" b="1" kern="1200">
+                <a:solidFill>
+                  <a:schemeClr val="tx1"/>
+                </a:solidFill>
+                <a:latin typeface="+mn-lt"/>
+                <a:ea typeface="+mn-ea"/>
+                <a:cs typeface="+mn-cs"/>
+              </a:defRPr>
+            </a:lvl1pPr>
+            <a:lvl2pPr marL="457200" indent="0" algn="l" defTabSz="914400" rtl="0" eaLnBrk="1" latinLnBrk="0" hangingPunct="1">
+              <a:lnSpc>
+                <a:spcPct val="90000"/>
+              </a:lnSpc>
+              <a:spcBef>
+                <a:spcPts val="500"/>
+              </a:spcBef>
+              <a:buFont typeface="Arial" panose="020B0604020202020204" pitchFamily="34" charset="0"/>
+              <a:buNone/>
+              <a:defRPr sz="2000" b="1" kern="1200">
+                <a:solidFill>
+                  <a:schemeClr val="tx1"/>
+                </a:solidFill>
+                <a:latin typeface="+mn-lt"/>
+                <a:ea typeface="+mn-ea"/>
+                <a:cs typeface="+mn-cs"/>
+              </a:defRPr>
+            </a:lvl2pPr>
+            <a:lvl3pPr marL="914400" indent="0" algn="l" defTabSz="914400" rtl="0" eaLnBrk="1" latinLnBrk="0" hangingPunct="1">
+              <a:lnSpc>
+                <a:spcPct val="90000"/>
+              </a:lnSpc>
+              <a:spcBef>
+                <a:spcPts val="500"/>
+              </a:spcBef>
+              <a:buFont typeface="Arial" panose="020B0604020202020204" pitchFamily="34" charset="0"/>
+              <a:buNone/>
+              <a:defRPr sz="1800" b="1" kern="1200">
+                <a:solidFill>
+                  <a:schemeClr val="tx1"/>
+                </a:solidFill>
+                <a:latin typeface="+mn-lt"/>
+                <a:ea typeface="+mn-ea"/>
+                <a:cs typeface="+mn-cs"/>
+              </a:defRPr>
+            </a:lvl3pPr>
+            <a:lvl4pPr marL="1371600" indent="0" algn="l" defTabSz="914400" rtl="0" eaLnBrk="1" latinLnBrk="0" hangingPunct="1">
+              <a:lnSpc>
+                <a:spcPct val="90000"/>
+              </a:lnSpc>
+              <a:spcBef>
+                <a:spcPts val="500"/>
+              </a:spcBef>
+              <a:buFont typeface="Arial" panose="020B0604020202020204" pitchFamily="34" charset="0"/>
+              <a:buNone/>
+              <a:defRPr sz="1600" b="1" kern="1200">
+                <a:solidFill>
+                  <a:schemeClr val="tx1"/>
+                </a:solidFill>
+                <a:latin typeface="+mn-lt"/>
+                <a:ea typeface="+mn-ea"/>
+                <a:cs typeface="+mn-cs"/>
+              </a:defRPr>
+            </a:lvl4pPr>
+            <a:lvl5pPr marL="1828800" indent="0" algn="l" defTabSz="914400" rtl="0" eaLnBrk="1" latinLnBrk="0" hangingPunct="1">
+              <a:lnSpc>
+                <a:spcPct val="90000"/>
+              </a:lnSpc>
+              <a:spcBef>
+                <a:spcPts val="500"/>
+              </a:spcBef>
+              <a:buFont typeface="Arial" panose="020B0604020202020204" pitchFamily="34" charset="0"/>
+              <a:buNone/>
+              <a:defRPr sz="1600" b="1" kern="1200">
+                <a:solidFill>
+                  <a:schemeClr val="tx1"/>
+                </a:solidFill>
+                <a:latin typeface="+mn-lt"/>
+                <a:ea typeface="+mn-ea"/>
+                <a:cs typeface="+mn-cs"/>
+              </a:defRPr>
+            </a:lvl5pPr>
+            <a:lvl6pPr marL="2286000" indent="0" algn="l" defTabSz="914400" rtl="0" eaLnBrk="1" latinLnBrk="0" hangingPunct="1">
+              <a:lnSpc>
+                <a:spcPct val="90000"/>
+              </a:lnSpc>
+              <a:spcBef>
+                <a:spcPts val="500"/>
+              </a:spcBef>
+              <a:buFont typeface="Arial" panose="020B0604020202020204" pitchFamily="34" charset="0"/>
+              <a:buNone/>
+              <a:defRPr sz="1600" b="1" kern="1200">
+                <a:solidFill>
+                  <a:schemeClr val="tx1"/>
+                </a:solidFill>
+                <a:latin typeface="+mn-lt"/>
+                <a:ea typeface="+mn-ea"/>
+                <a:cs typeface="+mn-cs"/>
+              </a:defRPr>
+            </a:lvl6pPr>
+            <a:lvl7pPr marL="2743200" indent="0" algn="l" defTabSz="914400" rtl="0" eaLnBrk="1" latinLnBrk="0" hangingPunct="1">
+              <a:lnSpc>
+                <a:spcPct val="90000"/>
+              </a:lnSpc>
+              <a:spcBef>
+                <a:spcPts val="500"/>
+              </a:spcBef>
+              <a:buFont typeface="Arial" panose="020B0604020202020204" pitchFamily="34" charset="0"/>
+              <a:buNone/>
+              <a:defRPr sz="1600" b="1" kern="1200">
+                <a:solidFill>
+                  <a:schemeClr val="tx1"/>
+                </a:solidFill>
+                <a:latin typeface="+mn-lt"/>
+                <a:ea typeface="+mn-ea"/>
+                <a:cs typeface="+mn-cs"/>
+              </a:defRPr>
+            </a:lvl7pPr>
+            <a:lvl8pPr marL="3200400" indent="0" algn="l" defTabSz="914400" rtl="0" eaLnBrk="1" latinLnBrk="0" hangingPunct="1">
+              <a:lnSpc>
+                <a:spcPct val="90000"/>
+              </a:lnSpc>
+              <a:spcBef>
+                <a:spcPts val="500"/>
+              </a:spcBef>
+              <a:buFont typeface="Arial" panose="020B0604020202020204" pitchFamily="34" charset="0"/>
+              <a:buNone/>
+              <a:defRPr sz="1600" b="1" kern="1200">
+                <a:solidFill>
+                  <a:schemeClr val="tx1"/>
+                </a:solidFill>
+                <a:latin typeface="+mn-lt"/>
+                <a:ea typeface="+mn-ea"/>
+                <a:cs typeface="+mn-cs"/>
+              </a:defRPr>
+            </a:lvl8pPr>
+            <a:lvl9pPr marL="3657600" indent="0" algn="l" defTabSz="914400" rtl="0" eaLnBrk="1" latinLnBrk="0" hangingPunct="1">
+              <a:lnSpc>
+                <a:spcPct val="90000"/>
+              </a:lnSpc>
+              <a:spcBef>
+                <a:spcPts val="500"/>
+              </a:spcBef>
+              <a:buFont typeface="Arial" panose="020B0604020202020204" pitchFamily="34" charset="0"/>
+              <a:buNone/>
+              <a:defRPr sz="1600" b="1" kern="1200">
+                <a:solidFill>
+                  <a:schemeClr val="tx1"/>
+                </a:solidFill>
+                <a:latin typeface="+mn-lt"/>
+                <a:ea typeface="+mn-ea"/>
+                <a:cs typeface="+mn-cs"/>
+              </a:defRPr>
+            </a:lvl9pPr>
+          </a:lstStyle>
+          <a:p>
+            <a:r>
+              <a:rPr lang="en-US"/>
+              <a:t>AlexNet</a:t>
+            </a:r>
+            <a:endParaRPr lang="en-IN" dirty="0"/>
+          </a:p>
+        </p:txBody>
+      </p:sp>
+      <p:sp>
+        <p:nvSpPr>
+          <p:cNvPr id="13" name="Text Placeholder 3">
+            <a:extLst>
+              <a:ext uri="{FF2B5EF4-FFF2-40B4-BE49-F238E27FC236}">
+                <a16:creationId xmlns:a16="http://schemas.microsoft.com/office/drawing/2014/main" id="{AE9469EB-645F-485E-A7A5-678572216051}"/>
+              </a:ext>
+            </a:extLst>
+          </p:cNvPr>
+          <p:cNvSpPr txBox="1">
+            <a:spLocks/>
+          </p:cNvSpPr>
+          <p:nvPr/>
+        </p:nvSpPr>
+        <p:spPr>
+          <a:xfrm>
+            <a:off x="1283653" y="4001699"/>
+            <a:ext cx="5157787" cy="421957"/>
+          </a:xfrm>
+          <a:prstGeom prst="rect">
+            <a:avLst/>
+          </a:prstGeom>
+        </p:spPr>
+        <p:txBody>
+          <a:bodyPr vert="horz" lIns="91440" tIns="45720" rIns="91440" bIns="45720" rtlCol="0" anchor="b">
+            <a:normAutofit/>
+          </a:bodyPr>
+          <a:lstStyle>
+            <a:lvl1pPr marL="0" indent="0" algn="l" defTabSz="914400" rtl="0" eaLnBrk="1" latinLnBrk="0" hangingPunct="1">
+              <a:lnSpc>
+                <a:spcPct val="90000"/>
+              </a:lnSpc>
+              <a:spcBef>
+                <a:spcPts val="1000"/>
+              </a:spcBef>
+              <a:buFont typeface="Arial" panose="020B0604020202020204" pitchFamily="34" charset="0"/>
+              <a:buNone/>
+              <a:defRPr sz="2400" b="1" kern="1200">
+                <a:solidFill>
+                  <a:schemeClr val="tx1"/>
+                </a:solidFill>
+                <a:latin typeface="+mn-lt"/>
+                <a:ea typeface="+mn-ea"/>
+                <a:cs typeface="+mn-cs"/>
+              </a:defRPr>
+            </a:lvl1pPr>
+            <a:lvl2pPr marL="457200" indent="0" algn="l" defTabSz="914400" rtl="0" eaLnBrk="1" latinLnBrk="0" hangingPunct="1">
+              <a:lnSpc>
+                <a:spcPct val="90000"/>
+              </a:lnSpc>
+              <a:spcBef>
+                <a:spcPts val="500"/>
+              </a:spcBef>
+              <a:buFont typeface="Arial" panose="020B0604020202020204" pitchFamily="34" charset="0"/>
+              <a:buNone/>
+              <a:defRPr sz="2000" b="1" kern="1200">
+                <a:solidFill>
+                  <a:schemeClr val="tx1"/>
+                </a:solidFill>
+                <a:latin typeface="+mn-lt"/>
+                <a:ea typeface="+mn-ea"/>
+                <a:cs typeface="+mn-cs"/>
+              </a:defRPr>
+            </a:lvl2pPr>
+            <a:lvl3pPr marL="914400" indent="0" algn="l" defTabSz="914400" rtl="0" eaLnBrk="1" latinLnBrk="0" hangingPunct="1">
+              <a:lnSpc>
+                <a:spcPct val="90000"/>
+              </a:lnSpc>
+              <a:spcBef>
+                <a:spcPts val="500"/>
+              </a:spcBef>
+              <a:buFont typeface="Arial" panose="020B0604020202020204" pitchFamily="34" charset="0"/>
+              <a:buNone/>
+              <a:defRPr sz="1800" b="1" kern="1200">
+                <a:solidFill>
+                  <a:schemeClr val="tx1"/>
+                </a:solidFill>
+                <a:latin typeface="+mn-lt"/>
+                <a:ea typeface="+mn-ea"/>
+                <a:cs typeface="+mn-cs"/>
+              </a:defRPr>
+            </a:lvl3pPr>
+            <a:lvl4pPr marL="1371600" indent="0" algn="l" defTabSz="914400" rtl="0" eaLnBrk="1" latinLnBrk="0" hangingPunct="1">
+              <a:lnSpc>
+                <a:spcPct val="90000"/>
+              </a:lnSpc>
+              <a:spcBef>
+                <a:spcPts val="500"/>
+              </a:spcBef>
+              <a:buFont typeface="Arial" panose="020B0604020202020204" pitchFamily="34" charset="0"/>
+              <a:buNone/>
+              <a:defRPr sz="1600" b="1" kern="1200">
+                <a:solidFill>
+                  <a:schemeClr val="tx1"/>
+                </a:solidFill>
+                <a:latin typeface="+mn-lt"/>
+                <a:ea typeface="+mn-ea"/>
+                <a:cs typeface="+mn-cs"/>
+              </a:defRPr>
+            </a:lvl4pPr>
+            <a:lvl5pPr marL="1828800" indent="0" algn="l" defTabSz="914400" rtl="0" eaLnBrk="1" latinLnBrk="0" hangingPunct="1">
+              <a:lnSpc>
+                <a:spcPct val="90000"/>
+              </a:lnSpc>
+              <a:spcBef>
+                <a:spcPts val="500"/>
+              </a:spcBef>
+              <a:buFont typeface="Arial" panose="020B0604020202020204" pitchFamily="34" charset="0"/>
+              <a:buNone/>
+              <a:defRPr sz="1600" b="1" kern="1200">
+                <a:solidFill>
+                  <a:schemeClr val="tx1"/>
+                </a:solidFill>
+                <a:latin typeface="+mn-lt"/>
+                <a:ea typeface="+mn-ea"/>
+                <a:cs typeface="+mn-cs"/>
+              </a:defRPr>
+            </a:lvl5pPr>
+            <a:lvl6pPr marL="2286000" indent="0" algn="l" defTabSz="914400" rtl="0" eaLnBrk="1" latinLnBrk="0" hangingPunct="1">
+              <a:lnSpc>
+                <a:spcPct val="90000"/>
+              </a:lnSpc>
+              <a:spcBef>
+                <a:spcPts val="500"/>
+              </a:spcBef>
+              <a:buFont typeface="Arial" panose="020B0604020202020204" pitchFamily="34" charset="0"/>
+              <a:buNone/>
+              <a:defRPr sz="1600" b="1" kern="1200">
+                <a:solidFill>
+                  <a:schemeClr val="tx1"/>
+                </a:solidFill>
+                <a:latin typeface="+mn-lt"/>
+                <a:ea typeface="+mn-ea"/>
+                <a:cs typeface="+mn-cs"/>
+              </a:defRPr>
+            </a:lvl6pPr>
+            <a:lvl7pPr marL="2743200" indent="0" algn="l" defTabSz="914400" rtl="0" eaLnBrk="1" latinLnBrk="0" hangingPunct="1">
+              <a:lnSpc>
+                <a:spcPct val="90000"/>
+              </a:lnSpc>
+              <a:spcBef>
+                <a:spcPts val="500"/>
+              </a:spcBef>
+              <a:buFont typeface="Arial" panose="020B0604020202020204" pitchFamily="34" charset="0"/>
+              <a:buNone/>
+              <a:defRPr sz="1600" b="1" kern="1200">
+                <a:solidFill>
+                  <a:schemeClr val="tx1"/>
+                </a:solidFill>
+                <a:latin typeface="+mn-lt"/>
+                <a:ea typeface="+mn-ea"/>
+                <a:cs typeface="+mn-cs"/>
+              </a:defRPr>
+            </a:lvl7pPr>
+            <a:lvl8pPr marL="3200400" indent="0" algn="l" defTabSz="914400" rtl="0" eaLnBrk="1" latinLnBrk="0" hangingPunct="1">
+              <a:lnSpc>
+                <a:spcPct val="90000"/>
+              </a:lnSpc>
+              <a:spcBef>
+                <a:spcPts val="500"/>
+              </a:spcBef>
+              <a:buFont typeface="Arial" panose="020B0604020202020204" pitchFamily="34" charset="0"/>
+              <a:buNone/>
+              <a:defRPr sz="1600" b="1" kern="1200">
+                <a:solidFill>
+                  <a:schemeClr val="tx1"/>
+                </a:solidFill>
+                <a:latin typeface="+mn-lt"/>
+                <a:ea typeface="+mn-ea"/>
+                <a:cs typeface="+mn-cs"/>
+              </a:defRPr>
+            </a:lvl8pPr>
+            <a:lvl9pPr marL="3657600" indent="0" algn="l" defTabSz="914400" rtl="0" eaLnBrk="1" latinLnBrk="0" hangingPunct="1">
+              <a:lnSpc>
+                <a:spcPct val="90000"/>
+              </a:lnSpc>
+              <a:spcBef>
+                <a:spcPts val="500"/>
+              </a:spcBef>
+              <a:buFont typeface="Arial" panose="020B0604020202020204" pitchFamily="34" charset="0"/>
+              <a:buNone/>
+              <a:defRPr sz="1600" b="1" kern="1200">
+                <a:solidFill>
+                  <a:schemeClr val="tx1"/>
+                </a:solidFill>
+                <a:latin typeface="+mn-lt"/>
+                <a:ea typeface="+mn-ea"/>
+                <a:cs typeface="+mn-cs"/>
+              </a:defRPr>
+            </a:lvl9pPr>
+          </a:lstStyle>
+          <a:p>
+            <a:r>
+              <a:rPr lang="en-US" dirty="0"/>
+              <a:t>ResNet18</a:t>
+            </a:r>
+            <a:endParaRPr lang="en-IN" dirty="0"/>
+          </a:p>
+        </p:txBody>
+      </p:sp>
+      <p:pic>
+        <p:nvPicPr>
+          <p:cNvPr id="16" name="Picture 15">
+            <a:extLst>
+              <a:ext uri="{FF2B5EF4-FFF2-40B4-BE49-F238E27FC236}">
+                <a16:creationId xmlns:a16="http://schemas.microsoft.com/office/drawing/2014/main" id="{434A866C-11FF-4CB8-AA47-3C1D3F3D5519}"/>
+              </a:ext>
+            </a:extLst>
+          </p:cNvPr>
+          <p:cNvPicPr>
+            <a:picLocks noChangeAspect="1"/>
+          </p:cNvPicPr>
+          <p:nvPr/>
+        </p:nvPicPr>
+        <p:blipFill>
+          <a:blip r:embed="rId4">
+            <a:extLst>
+              <a:ext uri="{28A0092B-C50C-407E-A947-70E740481C1C}">
+                <a14:useLocalDpi xmlns:a14="http://schemas.microsoft.com/office/drawing/2010/main" val="0"/>
+              </a:ext>
+            </a:extLst>
+          </a:blip>
+          <a:stretch>
+            <a:fillRect/>
+          </a:stretch>
+        </p:blipFill>
+        <p:spPr>
+          <a:xfrm>
+            <a:off x="6200986" y="4355535"/>
+            <a:ext cx="4626291" cy="2188140"/>
+          </a:xfrm>
+          <a:prstGeom prst="rect">
+            <a:avLst/>
+          </a:prstGeom>
+        </p:spPr>
+      </p:pic>
+      <p:pic>
+        <p:nvPicPr>
+          <p:cNvPr id="18" name="Picture 17">
+            <a:extLst>
+              <a:ext uri="{FF2B5EF4-FFF2-40B4-BE49-F238E27FC236}">
+                <a16:creationId xmlns:a16="http://schemas.microsoft.com/office/drawing/2014/main" id="{D6CC4BFE-7790-4B3E-8EE7-333492AAAF13}"/>
+              </a:ext>
+            </a:extLst>
+          </p:cNvPr>
+          <p:cNvPicPr>
+            <a:picLocks noChangeAspect="1"/>
+          </p:cNvPicPr>
+          <p:nvPr/>
+        </p:nvPicPr>
+        <p:blipFill>
+          <a:blip r:embed="rId5">
+            <a:extLst>
+              <a:ext uri="{28A0092B-C50C-407E-A947-70E740481C1C}">
+                <a14:useLocalDpi xmlns:a14="http://schemas.microsoft.com/office/drawing/2010/main" val="0"/>
+              </a:ext>
+            </a:extLst>
+          </a:blip>
+          <a:stretch>
+            <a:fillRect/>
+          </a:stretch>
+        </p:blipFill>
+        <p:spPr>
+          <a:xfrm>
+            <a:off x="555308" y="4423655"/>
+            <a:ext cx="4626291" cy="2120020"/>
+          </a:xfrm>
+          <a:prstGeom prst="rect">
+            <a:avLst/>
+          </a:prstGeom>
+        </p:spPr>
+      </p:pic>
     </p:spTree>
     <p:extLst>
       <p:ext uri="{BB962C8B-B14F-4D97-AF65-F5344CB8AC3E}">
@@ -8523,7 +9128,7 @@
           <p:cNvPr id="2" name="Title 1">
             <a:extLst>
               <a:ext uri="{FF2B5EF4-FFF2-40B4-BE49-F238E27FC236}">
-                <a16:creationId xmlns:a16="http://schemas.microsoft.com/office/drawing/2014/main" id="{BB84A478-05F9-4CCE-9830-CDEC4B2ADBDC}"/>
+                <a16:creationId xmlns:a16="http://schemas.microsoft.com/office/drawing/2014/main" id="{4FD18EBE-F529-4366-A2B9-006076FDE922}"/>
               </a:ext>
             </a:extLst>
           </p:cNvPr>
@@ -8536,25 +9141,61 @@
         </p:nvSpPr>
         <p:spPr>
           <a:xfrm>
-            <a:off x="838200" y="365125"/>
-            <a:ext cx="10515600" cy="1077595"/>
+            <a:off x="839788" y="314325"/>
+            <a:ext cx="10515600" cy="681355"/>
           </a:xfrm>
         </p:spPr>
         <p:txBody>
+          <a:bodyPr>
+            <a:normAutofit fontScale="90000"/>
+          </a:bodyPr>
+          <a:lstStyle/>
+          <a:p>
+            <a:r>
+              <a:rPr lang="en-US" dirty="0"/>
+              <a:t>Comparison of different </a:t>
+            </a:r>
+            <a:r>
+              <a:rPr lang="en-US" dirty="0" err="1"/>
+              <a:t>ConvNets</a:t>
+            </a:r>
+            <a:r>
+              <a:rPr lang="en-US" dirty="0"/>
+              <a:t> – Accuracy </a:t>
+            </a:r>
+            <a:endParaRPr lang="en-IN" dirty="0"/>
+          </a:p>
+        </p:txBody>
+      </p:sp>
+      <p:sp>
+        <p:nvSpPr>
+          <p:cNvPr id="4" name="Text Placeholder 3">
+            <a:extLst>
+              <a:ext uri="{FF2B5EF4-FFF2-40B4-BE49-F238E27FC236}">
+                <a16:creationId xmlns:a16="http://schemas.microsoft.com/office/drawing/2014/main" id="{34C62AD5-1DE4-43BD-9E53-23546D002C46}"/>
+              </a:ext>
+            </a:extLst>
+          </p:cNvPr>
+          <p:cNvSpPr>
+            <a:spLocks noGrp="1"/>
+          </p:cNvSpPr>
+          <p:nvPr>
+            <p:ph type="body" idx="1"/>
+          </p:nvPr>
+        </p:nvSpPr>
+        <p:spPr>
+          <a:xfrm>
+            <a:off x="6200986" y="4001698"/>
+            <a:ext cx="5157787" cy="421957"/>
+          </a:xfrm>
+        </p:spPr>
+        <p:txBody>
           <a:bodyPr/>
           <a:lstStyle/>
           <a:p>
             <a:r>
               <a:rPr lang="en-US" dirty="0"/>
-              <a:t>Comparison of </a:t>
-            </a:r>
-            <a:r>
-              <a:rPr lang="en-US" dirty="0" err="1"/>
-              <a:t>PyTorch</a:t>
-            </a:r>
-            <a:r>
-              <a:rPr lang="en-US" dirty="0"/>
-              <a:t> And TensorFlow</a:t>
+              <a:t>VGG16</a:t>
             </a:r>
             <a:endParaRPr lang="en-IN" dirty="0"/>
           </a:p>
@@ -8562,10 +9203,10 @@
       </p:sp>
       <p:sp>
         <p:nvSpPr>
-          <p:cNvPr id="3" name="Content Placeholder 2">
-            <a:extLst>
-              <a:ext uri="{FF2B5EF4-FFF2-40B4-BE49-F238E27FC236}">
-                <a16:creationId xmlns:a16="http://schemas.microsoft.com/office/drawing/2014/main" id="{27BED44B-E532-4C50-977A-A25758303994}"/>
+          <p:cNvPr id="6" name="Text Placeholder 5">
+            <a:extLst>
+              <a:ext uri="{FF2B5EF4-FFF2-40B4-BE49-F238E27FC236}">
+                <a16:creationId xmlns:a16="http://schemas.microsoft.com/office/drawing/2014/main" id="{43C19EE0-7E31-4906-93F1-6FCC65170A73}"/>
               </a:ext>
             </a:extLst>
           </p:cNvPr>
@@ -8573,97 +9214,573 @@
             <a:spLocks noGrp="1"/>
           </p:cNvSpPr>
           <p:nvPr>
-            <p:ph idx="1"/>
+            <p:ph type="body" sz="quarter" idx="3"/>
           </p:nvPr>
         </p:nvSpPr>
         <p:spPr>
           <a:xfrm>
-            <a:off x="838200" y="1442720"/>
-            <a:ext cx="10515600" cy="4734243"/>
+            <a:off x="6172200" y="1081979"/>
+            <a:ext cx="5183188" cy="421957"/>
           </a:xfrm>
         </p:spPr>
         <p:txBody>
           <a:bodyPr/>
           <a:lstStyle/>
           <a:p>
-            <a:pPr marL="0" indent="0">
-              <a:buNone/>
-            </a:pPr>
-            <a:r>
-              <a:rPr lang="en-US" b="1" dirty="0"/>
-              <a:t>Difference #1: Dynamic Vs Static graph definition</a:t>
-            </a:r>
-          </a:p>
-          <a:p>
-            <a:r>
-              <a:rPr lang="en-GB" dirty="0"/>
-              <a:t>Both frameworks operate on tensors and view any model as a directed acyclic graph (DAG), but they differ drastically on how you can define them.</a:t>
-            </a:r>
-          </a:p>
-          <a:p>
-            <a:r>
-              <a:rPr lang="en-GB" dirty="0"/>
-              <a:t>In TensorFlow, one has to define graph </a:t>
-            </a:r>
-            <a:r>
-              <a:rPr lang="en-GB" b="1" dirty="0"/>
-              <a:t>statically</a:t>
-            </a:r>
-            <a:r>
-              <a:rPr lang="en-GB" dirty="0"/>
-              <a:t> before a model can run. All communication with outer world is performed via </a:t>
-            </a:r>
-            <a:r>
-              <a:rPr lang="en-GB" dirty="0" err="1"/>
-              <a:t>tf.Session</a:t>
-            </a:r>
-            <a:r>
-              <a:rPr lang="en-GB" dirty="0"/>
-              <a:t> and </a:t>
-            </a:r>
-            <a:r>
-              <a:rPr lang="en-GB" dirty="0" err="1"/>
-              <a:t>tf.Placeholder</a:t>
-            </a:r>
-            <a:r>
-              <a:rPr lang="en-GB" dirty="0"/>
-              <a:t> Such a pain, isn’t it?</a:t>
-            </a:r>
-          </a:p>
-          <a:p>
-            <a:r>
-              <a:rPr lang="en-GB" dirty="0"/>
-              <a:t>In </a:t>
-            </a:r>
-            <a:r>
-              <a:rPr lang="en-GB" dirty="0" err="1"/>
-              <a:t>PyTorch</a:t>
-            </a:r>
-            <a:r>
-              <a:rPr lang="en-GB" dirty="0"/>
-              <a:t> things are way more imperative and </a:t>
-            </a:r>
-            <a:r>
-              <a:rPr lang="en-GB" b="1" dirty="0"/>
-              <a:t>dynamic</a:t>
-            </a:r>
-            <a:r>
-              <a:rPr lang="en-GB" dirty="0"/>
-              <a:t>: you can define, change and execute nodes as you go, no special session interfaces or placeholders. </a:t>
-            </a:r>
-          </a:p>
-          <a:p>
-            <a:endParaRPr lang="en-US" dirty="0"/>
-          </a:p>
-          <a:p>
-            <a:endParaRPr lang="en-IN" b="1" dirty="0"/>
-          </a:p>
-        </p:txBody>
-      </p:sp>
+            <a:r>
+              <a:rPr lang="en-US" dirty="0" err="1"/>
+              <a:t>SqueezeNet</a:t>
+            </a:r>
+            <a:endParaRPr lang="en-IN" dirty="0"/>
+          </a:p>
+        </p:txBody>
+      </p:sp>
+      <p:sp>
+        <p:nvSpPr>
+          <p:cNvPr id="12" name="Text Placeholder 3">
+            <a:extLst>
+              <a:ext uri="{FF2B5EF4-FFF2-40B4-BE49-F238E27FC236}">
+                <a16:creationId xmlns:a16="http://schemas.microsoft.com/office/drawing/2014/main" id="{E64ECE65-4A1A-427C-A79C-B1A070D3C360}"/>
+              </a:ext>
+            </a:extLst>
+          </p:cNvPr>
+          <p:cNvSpPr txBox="1">
+            <a:spLocks/>
+          </p:cNvSpPr>
+          <p:nvPr/>
+        </p:nvSpPr>
+        <p:spPr>
+          <a:xfrm>
+            <a:off x="1043199" y="1193641"/>
+            <a:ext cx="5157787" cy="421957"/>
+          </a:xfrm>
+          <a:prstGeom prst="rect">
+            <a:avLst/>
+          </a:prstGeom>
+        </p:spPr>
+        <p:txBody>
+          <a:bodyPr vert="horz" lIns="91440" tIns="45720" rIns="91440" bIns="45720" rtlCol="0" anchor="b">
+            <a:normAutofit/>
+          </a:bodyPr>
+          <a:lstStyle>
+            <a:lvl1pPr marL="0" indent="0" algn="l" defTabSz="914400" rtl="0" eaLnBrk="1" latinLnBrk="0" hangingPunct="1">
+              <a:lnSpc>
+                <a:spcPct val="90000"/>
+              </a:lnSpc>
+              <a:spcBef>
+                <a:spcPts val="1000"/>
+              </a:spcBef>
+              <a:buFont typeface="Arial" panose="020B0604020202020204" pitchFamily="34" charset="0"/>
+              <a:buNone/>
+              <a:defRPr sz="2400" b="1" kern="1200">
+                <a:solidFill>
+                  <a:schemeClr val="tx1"/>
+                </a:solidFill>
+                <a:latin typeface="+mn-lt"/>
+                <a:ea typeface="+mn-ea"/>
+                <a:cs typeface="+mn-cs"/>
+              </a:defRPr>
+            </a:lvl1pPr>
+            <a:lvl2pPr marL="457200" indent="0" algn="l" defTabSz="914400" rtl="0" eaLnBrk="1" latinLnBrk="0" hangingPunct="1">
+              <a:lnSpc>
+                <a:spcPct val="90000"/>
+              </a:lnSpc>
+              <a:spcBef>
+                <a:spcPts val="500"/>
+              </a:spcBef>
+              <a:buFont typeface="Arial" panose="020B0604020202020204" pitchFamily="34" charset="0"/>
+              <a:buNone/>
+              <a:defRPr sz="2000" b="1" kern="1200">
+                <a:solidFill>
+                  <a:schemeClr val="tx1"/>
+                </a:solidFill>
+                <a:latin typeface="+mn-lt"/>
+                <a:ea typeface="+mn-ea"/>
+                <a:cs typeface="+mn-cs"/>
+              </a:defRPr>
+            </a:lvl2pPr>
+            <a:lvl3pPr marL="914400" indent="0" algn="l" defTabSz="914400" rtl="0" eaLnBrk="1" latinLnBrk="0" hangingPunct="1">
+              <a:lnSpc>
+                <a:spcPct val="90000"/>
+              </a:lnSpc>
+              <a:spcBef>
+                <a:spcPts val="500"/>
+              </a:spcBef>
+              <a:buFont typeface="Arial" panose="020B0604020202020204" pitchFamily="34" charset="0"/>
+              <a:buNone/>
+              <a:defRPr sz="1800" b="1" kern="1200">
+                <a:solidFill>
+                  <a:schemeClr val="tx1"/>
+                </a:solidFill>
+                <a:latin typeface="+mn-lt"/>
+                <a:ea typeface="+mn-ea"/>
+                <a:cs typeface="+mn-cs"/>
+              </a:defRPr>
+            </a:lvl3pPr>
+            <a:lvl4pPr marL="1371600" indent="0" algn="l" defTabSz="914400" rtl="0" eaLnBrk="1" latinLnBrk="0" hangingPunct="1">
+              <a:lnSpc>
+                <a:spcPct val="90000"/>
+              </a:lnSpc>
+              <a:spcBef>
+                <a:spcPts val="500"/>
+              </a:spcBef>
+              <a:buFont typeface="Arial" panose="020B0604020202020204" pitchFamily="34" charset="0"/>
+              <a:buNone/>
+              <a:defRPr sz="1600" b="1" kern="1200">
+                <a:solidFill>
+                  <a:schemeClr val="tx1"/>
+                </a:solidFill>
+                <a:latin typeface="+mn-lt"/>
+                <a:ea typeface="+mn-ea"/>
+                <a:cs typeface="+mn-cs"/>
+              </a:defRPr>
+            </a:lvl4pPr>
+            <a:lvl5pPr marL="1828800" indent="0" algn="l" defTabSz="914400" rtl="0" eaLnBrk="1" latinLnBrk="0" hangingPunct="1">
+              <a:lnSpc>
+                <a:spcPct val="90000"/>
+              </a:lnSpc>
+              <a:spcBef>
+                <a:spcPts val="500"/>
+              </a:spcBef>
+              <a:buFont typeface="Arial" panose="020B0604020202020204" pitchFamily="34" charset="0"/>
+              <a:buNone/>
+              <a:defRPr sz="1600" b="1" kern="1200">
+                <a:solidFill>
+                  <a:schemeClr val="tx1"/>
+                </a:solidFill>
+                <a:latin typeface="+mn-lt"/>
+                <a:ea typeface="+mn-ea"/>
+                <a:cs typeface="+mn-cs"/>
+              </a:defRPr>
+            </a:lvl5pPr>
+            <a:lvl6pPr marL="2286000" indent="0" algn="l" defTabSz="914400" rtl="0" eaLnBrk="1" latinLnBrk="0" hangingPunct="1">
+              <a:lnSpc>
+                <a:spcPct val="90000"/>
+              </a:lnSpc>
+              <a:spcBef>
+                <a:spcPts val="500"/>
+              </a:spcBef>
+              <a:buFont typeface="Arial" panose="020B0604020202020204" pitchFamily="34" charset="0"/>
+              <a:buNone/>
+              <a:defRPr sz="1600" b="1" kern="1200">
+                <a:solidFill>
+                  <a:schemeClr val="tx1"/>
+                </a:solidFill>
+                <a:latin typeface="+mn-lt"/>
+                <a:ea typeface="+mn-ea"/>
+                <a:cs typeface="+mn-cs"/>
+              </a:defRPr>
+            </a:lvl6pPr>
+            <a:lvl7pPr marL="2743200" indent="0" algn="l" defTabSz="914400" rtl="0" eaLnBrk="1" latinLnBrk="0" hangingPunct="1">
+              <a:lnSpc>
+                <a:spcPct val="90000"/>
+              </a:lnSpc>
+              <a:spcBef>
+                <a:spcPts val="500"/>
+              </a:spcBef>
+              <a:buFont typeface="Arial" panose="020B0604020202020204" pitchFamily="34" charset="0"/>
+              <a:buNone/>
+              <a:defRPr sz="1600" b="1" kern="1200">
+                <a:solidFill>
+                  <a:schemeClr val="tx1"/>
+                </a:solidFill>
+                <a:latin typeface="+mn-lt"/>
+                <a:ea typeface="+mn-ea"/>
+                <a:cs typeface="+mn-cs"/>
+              </a:defRPr>
+            </a:lvl7pPr>
+            <a:lvl8pPr marL="3200400" indent="0" algn="l" defTabSz="914400" rtl="0" eaLnBrk="1" latinLnBrk="0" hangingPunct="1">
+              <a:lnSpc>
+                <a:spcPct val="90000"/>
+              </a:lnSpc>
+              <a:spcBef>
+                <a:spcPts val="500"/>
+              </a:spcBef>
+              <a:buFont typeface="Arial" panose="020B0604020202020204" pitchFamily="34" charset="0"/>
+              <a:buNone/>
+              <a:defRPr sz="1600" b="1" kern="1200">
+                <a:solidFill>
+                  <a:schemeClr val="tx1"/>
+                </a:solidFill>
+                <a:latin typeface="+mn-lt"/>
+                <a:ea typeface="+mn-ea"/>
+                <a:cs typeface="+mn-cs"/>
+              </a:defRPr>
+            </a:lvl8pPr>
+            <a:lvl9pPr marL="3657600" indent="0" algn="l" defTabSz="914400" rtl="0" eaLnBrk="1" latinLnBrk="0" hangingPunct="1">
+              <a:lnSpc>
+                <a:spcPct val="90000"/>
+              </a:lnSpc>
+              <a:spcBef>
+                <a:spcPts val="500"/>
+              </a:spcBef>
+              <a:buFont typeface="Arial" panose="020B0604020202020204" pitchFamily="34" charset="0"/>
+              <a:buNone/>
+              <a:defRPr sz="1600" b="1" kern="1200">
+                <a:solidFill>
+                  <a:schemeClr val="tx1"/>
+                </a:solidFill>
+                <a:latin typeface="+mn-lt"/>
+                <a:ea typeface="+mn-ea"/>
+                <a:cs typeface="+mn-cs"/>
+              </a:defRPr>
+            </a:lvl9pPr>
+          </a:lstStyle>
+          <a:p>
+            <a:r>
+              <a:rPr lang="en-US"/>
+              <a:t>AlexNet</a:t>
+            </a:r>
+            <a:endParaRPr lang="en-IN" dirty="0"/>
+          </a:p>
+        </p:txBody>
+      </p:sp>
+      <p:sp>
+        <p:nvSpPr>
+          <p:cNvPr id="13" name="Text Placeholder 3">
+            <a:extLst>
+              <a:ext uri="{FF2B5EF4-FFF2-40B4-BE49-F238E27FC236}">
+                <a16:creationId xmlns:a16="http://schemas.microsoft.com/office/drawing/2014/main" id="{AE9469EB-645F-485E-A7A5-678572216051}"/>
+              </a:ext>
+            </a:extLst>
+          </p:cNvPr>
+          <p:cNvSpPr txBox="1">
+            <a:spLocks/>
+          </p:cNvSpPr>
+          <p:nvPr/>
+        </p:nvSpPr>
+        <p:spPr>
+          <a:xfrm>
+            <a:off x="1283653" y="4001699"/>
+            <a:ext cx="5157787" cy="421957"/>
+          </a:xfrm>
+          <a:prstGeom prst="rect">
+            <a:avLst/>
+          </a:prstGeom>
+        </p:spPr>
+        <p:txBody>
+          <a:bodyPr vert="horz" lIns="91440" tIns="45720" rIns="91440" bIns="45720" rtlCol="0" anchor="b">
+            <a:normAutofit/>
+          </a:bodyPr>
+          <a:lstStyle>
+            <a:lvl1pPr marL="0" indent="0" algn="l" defTabSz="914400" rtl="0" eaLnBrk="1" latinLnBrk="0" hangingPunct="1">
+              <a:lnSpc>
+                <a:spcPct val="90000"/>
+              </a:lnSpc>
+              <a:spcBef>
+                <a:spcPts val="1000"/>
+              </a:spcBef>
+              <a:buFont typeface="Arial" panose="020B0604020202020204" pitchFamily="34" charset="0"/>
+              <a:buNone/>
+              <a:defRPr sz="2400" b="1" kern="1200">
+                <a:solidFill>
+                  <a:schemeClr val="tx1"/>
+                </a:solidFill>
+                <a:latin typeface="+mn-lt"/>
+                <a:ea typeface="+mn-ea"/>
+                <a:cs typeface="+mn-cs"/>
+              </a:defRPr>
+            </a:lvl1pPr>
+            <a:lvl2pPr marL="457200" indent="0" algn="l" defTabSz="914400" rtl="0" eaLnBrk="1" latinLnBrk="0" hangingPunct="1">
+              <a:lnSpc>
+                <a:spcPct val="90000"/>
+              </a:lnSpc>
+              <a:spcBef>
+                <a:spcPts val="500"/>
+              </a:spcBef>
+              <a:buFont typeface="Arial" panose="020B0604020202020204" pitchFamily="34" charset="0"/>
+              <a:buNone/>
+              <a:defRPr sz="2000" b="1" kern="1200">
+                <a:solidFill>
+                  <a:schemeClr val="tx1"/>
+                </a:solidFill>
+                <a:latin typeface="+mn-lt"/>
+                <a:ea typeface="+mn-ea"/>
+                <a:cs typeface="+mn-cs"/>
+              </a:defRPr>
+            </a:lvl2pPr>
+            <a:lvl3pPr marL="914400" indent="0" algn="l" defTabSz="914400" rtl="0" eaLnBrk="1" latinLnBrk="0" hangingPunct="1">
+              <a:lnSpc>
+                <a:spcPct val="90000"/>
+              </a:lnSpc>
+              <a:spcBef>
+                <a:spcPts val="500"/>
+              </a:spcBef>
+              <a:buFont typeface="Arial" panose="020B0604020202020204" pitchFamily="34" charset="0"/>
+              <a:buNone/>
+              <a:defRPr sz="1800" b="1" kern="1200">
+                <a:solidFill>
+                  <a:schemeClr val="tx1"/>
+                </a:solidFill>
+                <a:latin typeface="+mn-lt"/>
+                <a:ea typeface="+mn-ea"/>
+                <a:cs typeface="+mn-cs"/>
+              </a:defRPr>
+            </a:lvl3pPr>
+            <a:lvl4pPr marL="1371600" indent="0" algn="l" defTabSz="914400" rtl="0" eaLnBrk="1" latinLnBrk="0" hangingPunct="1">
+              <a:lnSpc>
+                <a:spcPct val="90000"/>
+              </a:lnSpc>
+              <a:spcBef>
+                <a:spcPts val="500"/>
+              </a:spcBef>
+              <a:buFont typeface="Arial" panose="020B0604020202020204" pitchFamily="34" charset="0"/>
+              <a:buNone/>
+              <a:defRPr sz="1600" b="1" kern="1200">
+                <a:solidFill>
+                  <a:schemeClr val="tx1"/>
+                </a:solidFill>
+                <a:latin typeface="+mn-lt"/>
+                <a:ea typeface="+mn-ea"/>
+                <a:cs typeface="+mn-cs"/>
+              </a:defRPr>
+            </a:lvl4pPr>
+            <a:lvl5pPr marL="1828800" indent="0" algn="l" defTabSz="914400" rtl="0" eaLnBrk="1" latinLnBrk="0" hangingPunct="1">
+              <a:lnSpc>
+                <a:spcPct val="90000"/>
+              </a:lnSpc>
+              <a:spcBef>
+                <a:spcPts val="500"/>
+              </a:spcBef>
+              <a:buFont typeface="Arial" panose="020B0604020202020204" pitchFamily="34" charset="0"/>
+              <a:buNone/>
+              <a:defRPr sz="1600" b="1" kern="1200">
+                <a:solidFill>
+                  <a:schemeClr val="tx1"/>
+                </a:solidFill>
+                <a:latin typeface="+mn-lt"/>
+                <a:ea typeface="+mn-ea"/>
+                <a:cs typeface="+mn-cs"/>
+              </a:defRPr>
+            </a:lvl5pPr>
+            <a:lvl6pPr marL="2286000" indent="0" algn="l" defTabSz="914400" rtl="0" eaLnBrk="1" latinLnBrk="0" hangingPunct="1">
+              <a:lnSpc>
+                <a:spcPct val="90000"/>
+              </a:lnSpc>
+              <a:spcBef>
+                <a:spcPts val="500"/>
+              </a:spcBef>
+              <a:buFont typeface="Arial" panose="020B0604020202020204" pitchFamily="34" charset="0"/>
+              <a:buNone/>
+              <a:defRPr sz="1600" b="1" kern="1200">
+                <a:solidFill>
+                  <a:schemeClr val="tx1"/>
+                </a:solidFill>
+                <a:latin typeface="+mn-lt"/>
+                <a:ea typeface="+mn-ea"/>
+                <a:cs typeface="+mn-cs"/>
+              </a:defRPr>
+            </a:lvl6pPr>
+            <a:lvl7pPr marL="2743200" indent="0" algn="l" defTabSz="914400" rtl="0" eaLnBrk="1" latinLnBrk="0" hangingPunct="1">
+              <a:lnSpc>
+                <a:spcPct val="90000"/>
+              </a:lnSpc>
+              <a:spcBef>
+                <a:spcPts val="500"/>
+              </a:spcBef>
+              <a:buFont typeface="Arial" panose="020B0604020202020204" pitchFamily="34" charset="0"/>
+              <a:buNone/>
+              <a:defRPr sz="1600" b="1" kern="1200">
+                <a:solidFill>
+                  <a:schemeClr val="tx1"/>
+                </a:solidFill>
+                <a:latin typeface="+mn-lt"/>
+                <a:ea typeface="+mn-ea"/>
+                <a:cs typeface="+mn-cs"/>
+              </a:defRPr>
+            </a:lvl7pPr>
+            <a:lvl8pPr marL="3200400" indent="0" algn="l" defTabSz="914400" rtl="0" eaLnBrk="1" latinLnBrk="0" hangingPunct="1">
+              <a:lnSpc>
+                <a:spcPct val="90000"/>
+              </a:lnSpc>
+              <a:spcBef>
+                <a:spcPts val="500"/>
+              </a:spcBef>
+              <a:buFont typeface="Arial" panose="020B0604020202020204" pitchFamily="34" charset="0"/>
+              <a:buNone/>
+              <a:defRPr sz="1600" b="1" kern="1200">
+                <a:solidFill>
+                  <a:schemeClr val="tx1"/>
+                </a:solidFill>
+                <a:latin typeface="+mn-lt"/>
+                <a:ea typeface="+mn-ea"/>
+                <a:cs typeface="+mn-cs"/>
+              </a:defRPr>
+            </a:lvl8pPr>
+            <a:lvl9pPr marL="3657600" indent="0" algn="l" defTabSz="914400" rtl="0" eaLnBrk="1" latinLnBrk="0" hangingPunct="1">
+              <a:lnSpc>
+                <a:spcPct val="90000"/>
+              </a:lnSpc>
+              <a:spcBef>
+                <a:spcPts val="500"/>
+              </a:spcBef>
+              <a:buFont typeface="Arial" panose="020B0604020202020204" pitchFamily="34" charset="0"/>
+              <a:buNone/>
+              <a:defRPr sz="1600" b="1" kern="1200">
+                <a:solidFill>
+                  <a:schemeClr val="tx1"/>
+                </a:solidFill>
+                <a:latin typeface="+mn-lt"/>
+                <a:ea typeface="+mn-ea"/>
+                <a:cs typeface="+mn-cs"/>
+              </a:defRPr>
+            </a:lvl9pPr>
+          </a:lstStyle>
+          <a:p>
+            <a:r>
+              <a:rPr lang="en-US" dirty="0"/>
+              <a:t>ResNet18</a:t>
+            </a:r>
+            <a:endParaRPr lang="en-IN" dirty="0"/>
+          </a:p>
+        </p:txBody>
+      </p:sp>
+      <p:pic>
+        <p:nvPicPr>
+          <p:cNvPr id="8" name="Content Placeholder 7">
+            <a:extLst>
+              <a:ext uri="{FF2B5EF4-FFF2-40B4-BE49-F238E27FC236}">
+                <a16:creationId xmlns:a16="http://schemas.microsoft.com/office/drawing/2014/main" id="{A5867BA1-C2CF-40FA-A2C4-1CDCDCA762D0}"/>
+              </a:ext>
+            </a:extLst>
+          </p:cNvPr>
+          <p:cNvPicPr>
+            <a:picLocks noGrp="1" noChangeAspect="1"/>
+          </p:cNvPicPr>
+          <p:nvPr>
+            <p:ph sz="half" idx="2"/>
+          </p:nvPr>
+        </p:nvPicPr>
+        <p:blipFill>
+          <a:blip r:embed="rId2">
+            <a:extLst>
+              <a:ext uri="{28A0092B-C50C-407E-A947-70E740481C1C}">
+                <a14:useLocalDpi xmlns:a14="http://schemas.microsoft.com/office/drawing/2010/main" val="0"/>
+              </a:ext>
+            </a:extLst>
+          </a:blip>
+          <a:stretch>
+            <a:fillRect/>
+          </a:stretch>
+        </p:blipFill>
+        <p:spPr>
+          <a:xfrm>
+            <a:off x="555308" y="1475221"/>
+            <a:ext cx="4626291" cy="2120019"/>
+          </a:xfrm>
+        </p:spPr>
+      </p:pic>
+      <p:pic>
+        <p:nvPicPr>
+          <p:cNvPr id="17" name="Content Placeholder 16">
+            <a:extLst>
+              <a:ext uri="{FF2B5EF4-FFF2-40B4-BE49-F238E27FC236}">
+                <a16:creationId xmlns:a16="http://schemas.microsoft.com/office/drawing/2014/main" id="{24C89AD3-C9C9-4841-8716-85983EA988CB}"/>
+              </a:ext>
+            </a:extLst>
+          </p:cNvPr>
+          <p:cNvPicPr>
+            <a:picLocks noGrp="1" noChangeAspect="1"/>
+          </p:cNvPicPr>
+          <p:nvPr>
+            <p:ph sz="quarter" idx="4"/>
+          </p:nvPr>
+        </p:nvPicPr>
+        <p:blipFill>
+          <a:blip r:embed="rId3">
+            <a:extLst>
+              <a:ext uri="{28A0092B-C50C-407E-A947-70E740481C1C}">
+                <a14:useLocalDpi xmlns:a14="http://schemas.microsoft.com/office/drawing/2010/main" val="0"/>
+              </a:ext>
+            </a:extLst>
+          </a:blip>
+          <a:stretch>
+            <a:fillRect/>
+          </a:stretch>
+        </p:blipFill>
+        <p:spPr>
+          <a:xfrm>
+            <a:off x="5840624" y="1475221"/>
+            <a:ext cx="4986654" cy="2120019"/>
+          </a:xfrm>
+        </p:spPr>
+      </p:pic>
+      <p:pic>
+        <p:nvPicPr>
+          <p:cNvPr id="20" name="Picture 19">
+            <a:extLst>
+              <a:ext uri="{FF2B5EF4-FFF2-40B4-BE49-F238E27FC236}">
+                <a16:creationId xmlns:a16="http://schemas.microsoft.com/office/drawing/2014/main" id="{A8552E14-018F-48D3-9C2E-2CB5701B411F}"/>
+              </a:ext>
+            </a:extLst>
+          </p:cNvPr>
+          <p:cNvPicPr>
+            <a:picLocks noChangeAspect="1"/>
+          </p:cNvPicPr>
+          <p:nvPr/>
+        </p:nvPicPr>
+        <p:blipFill>
+          <a:blip r:embed="rId4">
+            <a:extLst>
+              <a:ext uri="{28A0092B-C50C-407E-A947-70E740481C1C}">
+                <a14:useLocalDpi xmlns:a14="http://schemas.microsoft.com/office/drawing/2010/main" val="0"/>
+              </a:ext>
+            </a:extLst>
+          </a:blip>
+          <a:stretch>
+            <a:fillRect/>
+          </a:stretch>
+        </p:blipFill>
+        <p:spPr>
+          <a:xfrm>
+            <a:off x="555308" y="4355534"/>
+            <a:ext cx="4626291" cy="2188140"/>
+          </a:xfrm>
+          <a:prstGeom prst="rect">
+            <a:avLst/>
+          </a:prstGeom>
+        </p:spPr>
+      </p:pic>
+      <p:pic>
+        <p:nvPicPr>
+          <p:cNvPr id="22" name="Picture 21">
+            <a:extLst>
+              <a:ext uri="{FF2B5EF4-FFF2-40B4-BE49-F238E27FC236}">
+                <a16:creationId xmlns:a16="http://schemas.microsoft.com/office/drawing/2014/main" id="{BF0BEF18-C917-47C5-AE96-89A657F6A3B5}"/>
+              </a:ext>
+            </a:extLst>
+          </p:cNvPr>
+          <p:cNvPicPr>
+            <a:picLocks noChangeAspect="1"/>
+          </p:cNvPicPr>
+          <p:nvPr/>
+        </p:nvPicPr>
+        <p:blipFill>
+          <a:blip r:embed="rId5">
+            <a:extLst>
+              <a:ext uri="{28A0092B-C50C-407E-A947-70E740481C1C}">
+                <a14:useLocalDpi xmlns:a14="http://schemas.microsoft.com/office/drawing/2010/main" val="0"/>
+              </a:ext>
+            </a:extLst>
+          </a:blip>
+          <a:stretch>
+            <a:fillRect/>
+          </a:stretch>
+        </p:blipFill>
+        <p:spPr>
+          <a:xfrm>
+            <a:off x="6096001" y="4355534"/>
+            <a:ext cx="4731278" cy="2290300"/>
+          </a:xfrm>
+          <a:prstGeom prst="rect">
+            <a:avLst/>
+          </a:prstGeom>
+        </p:spPr>
+      </p:pic>
     </p:spTree>
     <p:extLst>
       <p:ext uri="{BB962C8B-B14F-4D97-AF65-F5344CB8AC3E}">
-        <p14:creationId xmlns:p14="http://schemas.microsoft.com/office/powerpoint/2010/main" val="3759910449"/>
+        <p14:creationId xmlns:p14="http://schemas.microsoft.com/office/powerpoint/2010/main" val="1304485584"/>
       </p:ext>
     </p:extLst>
   </p:cSld>
@@ -8690,115 +9807,671 @@
           <a:chExt cx="0" cy="0"/>
         </a:xfrm>
       </p:grpSpPr>
-      <p:sp>
-        <p:nvSpPr>
-          <p:cNvPr id="3" name="Content Placeholder 2">
-            <a:extLst>
-              <a:ext uri="{FF2B5EF4-FFF2-40B4-BE49-F238E27FC236}">
-                <a16:creationId xmlns:a16="http://schemas.microsoft.com/office/drawing/2014/main" id="{FC1DC2BD-0C97-4FD4-8C6B-E0FBEAD109A8}"/>
-              </a:ext>
-            </a:extLst>
-          </p:cNvPr>
-          <p:cNvSpPr>
-            <a:spLocks noGrp="1"/>
-          </p:cNvSpPr>
+      <p:graphicFrame>
+        <p:nvGraphicFramePr>
+          <p:cNvPr id="9" name="Content Placeholder 8">
+            <a:extLst>
+              <a:ext uri="{FF2B5EF4-FFF2-40B4-BE49-F238E27FC236}">
+                <a16:creationId xmlns:a16="http://schemas.microsoft.com/office/drawing/2014/main" id="{2CDC16A6-3D63-4B82-A778-F51D56A9F2BE}"/>
+              </a:ext>
+            </a:extLst>
+          </p:cNvPr>
+          <p:cNvGraphicFramePr>
+            <a:graphicFrameLocks noGrp="1"/>
+          </p:cNvGraphicFramePr>
           <p:nvPr>
             <p:ph idx="1"/>
-          </p:nvPr>
+            <p:extLst>
+              <p:ext uri="{D42A27DB-BD31-4B8C-83A1-F6EECF244321}">
+                <p14:modId xmlns:p14="http://schemas.microsoft.com/office/powerpoint/2010/main" val="3295271628"/>
+              </p:ext>
+            </p:extLst>
+          </p:nvPr>
+        </p:nvGraphicFramePr>
+        <p:xfrm>
+          <a:off x="838200" y="1102678"/>
+          <a:ext cx="10571480" cy="3830000"/>
+        </p:xfrm>
+        <a:graphic>
+          <a:graphicData uri="http://schemas.openxmlformats.org/drawingml/2006/table">
+            <a:tbl>
+              <a:tblPr firstRow="1" bandRow="1">
+                <a:tableStyleId>{5C22544A-7EE6-4342-B048-85BDC9FD1C3A}</a:tableStyleId>
+              </a:tblPr>
+              <a:tblGrid>
+                <a:gridCol w="2642870">
+                  <a:extLst>
+                    <a:ext uri="{9D8B030D-6E8A-4147-A177-3AD203B41FA5}">
+                      <a16:colId xmlns:a16="http://schemas.microsoft.com/office/drawing/2014/main" val="2283339588"/>
+                    </a:ext>
+                  </a:extLst>
+                </a:gridCol>
+                <a:gridCol w="2642870">
+                  <a:extLst>
+                    <a:ext uri="{9D8B030D-6E8A-4147-A177-3AD203B41FA5}">
+                      <a16:colId xmlns:a16="http://schemas.microsoft.com/office/drawing/2014/main" val="2664953467"/>
+                    </a:ext>
+                  </a:extLst>
+                </a:gridCol>
+                <a:gridCol w="2642870">
+                  <a:extLst>
+                    <a:ext uri="{9D8B030D-6E8A-4147-A177-3AD203B41FA5}">
+                      <a16:colId xmlns:a16="http://schemas.microsoft.com/office/drawing/2014/main" val="3115928897"/>
+                    </a:ext>
+                  </a:extLst>
+                </a:gridCol>
+                <a:gridCol w="2642870">
+                  <a:extLst>
+                    <a:ext uri="{9D8B030D-6E8A-4147-A177-3AD203B41FA5}">
+                      <a16:colId xmlns:a16="http://schemas.microsoft.com/office/drawing/2014/main" val="3313464739"/>
+                    </a:ext>
+                  </a:extLst>
+                </a:gridCol>
+              </a:tblGrid>
+              <a:tr h="766000">
+                <a:tc>
+                  <a:txBody>
+                    <a:bodyPr/>
+                    <a:lstStyle/>
+                    <a:p>
+                      <a:pPr algn="ctr"/>
+                      <a:r>
+                        <a:rPr lang="en-US" sz="2000" dirty="0" err="1"/>
+                        <a:t>ConvNet</a:t>
+                      </a:r>
+                      <a:endParaRPr lang="en-IN" sz="2000" dirty="0"/>
+                    </a:p>
+                  </a:txBody>
+                  <a:tcPr/>
+                </a:tc>
+                <a:tc>
+                  <a:txBody>
+                    <a:bodyPr/>
+                    <a:lstStyle/>
+                    <a:p>
+                      <a:pPr algn="ctr"/>
+                      <a:r>
+                        <a:rPr lang="en-US" sz="2000" dirty="0"/>
+                        <a:t>Train Accuracy</a:t>
+                      </a:r>
+                      <a:endParaRPr lang="en-IN" sz="2000" dirty="0"/>
+                    </a:p>
+                  </a:txBody>
+                  <a:tcPr/>
+                </a:tc>
+                <a:tc>
+                  <a:txBody>
+                    <a:bodyPr/>
+                    <a:lstStyle/>
+                    <a:p>
+                      <a:pPr algn="ctr"/>
+                      <a:r>
+                        <a:rPr lang="en-US" sz="2000" dirty="0"/>
+                        <a:t>Validation Accuracy</a:t>
+                      </a:r>
+                      <a:endParaRPr lang="en-IN" sz="2000" dirty="0"/>
+                    </a:p>
+                  </a:txBody>
+                  <a:tcPr/>
+                </a:tc>
+                <a:tc>
+                  <a:txBody>
+                    <a:bodyPr/>
+                    <a:lstStyle/>
+                    <a:p>
+                      <a:pPr algn="ctr"/>
+                      <a:r>
+                        <a:rPr lang="en-US" sz="2000" dirty="0"/>
+                        <a:t>Test Accuracy</a:t>
+                      </a:r>
+                      <a:endParaRPr lang="en-IN" sz="2000" dirty="0"/>
+                    </a:p>
+                  </a:txBody>
+                  <a:tcPr/>
+                </a:tc>
+                <a:extLst>
+                  <a:ext uri="{0D108BD9-81ED-4DB2-BD59-A6C34878D82A}">
+                    <a16:rowId xmlns:a16="http://schemas.microsoft.com/office/drawing/2014/main" val="1159715706"/>
+                  </a:ext>
+                </a:extLst>
+              </a:tr>
+              <a:tr h="766000">
+                <a:tc>
+                  <a:txBody>
+                    <a:bodyPr/>
+                    <a:lstStyle/>
+                    <a:p>
+                      <a:pPr algn="ctr"/>
+                      <a:r>
+                        <a:rPr lang="en-US" sz="2400" b="1" kern="1200" dirty="0" err="1">
+                          <a:solidFill>
+                            <a:schemeClr val="tx1">
+                              <a:lumMod val="75000"/>
+                              <a:lumOff val="25000"/>
+                            </a:schemeClr>
+                          </a:solidFill>
+                          <a:latin typeface="+mn-lt"/>
+                          <a:ea typeface="+mn-ea"/>
+                          <a:cs typeface="+mn-cs"/>
+                        </a:rPr>
+                        <a:t>AlexNet</a:t>
+                      </a:r>
+                      <a:endParaRPr lang="en-IN" sz="2400" b="1" kern="1200" dirty="0">
+                        <a:solidFill>
+                          <a:schemeClr val="tx1">
+                            <a:lumMod val="75000"/>
+                            <a:lumOff val="25000"/>
+                          </a:schemeClr>
+                        </a:solidFill>
+                        <a:latin typeface="+mn-lt"/>
+                        <a:ea typeface="+mn-ea"/>
+                        <a:cs typeface="+mn-cs"/>
+                      </a:endParaRPr>
+                    </a:p>
+                  </a:txBody>
+                  <a:tcPr/>
+                </a:tc>
+                <a:tc>
+                  <a:txBody>
+                    <a:bodyPr/>
+                    <a:lstStyle/>
+                    <a:p>
+                      <a:pPr algn="ctr"/>
+                      <a:r>
+                        <a:rPr lang="en-US" sz="2400" dirty="0"/>
+                        <a:t>98.8%</a:t>
+                      </a:r>
+                      <a:endParaRPr lang="en-IN" sz="2400" dirty="0"/>
+                    </a:p>
+                  </a:txBody>
+                  <a:tcPr/>
+                </a:tc>
+                <a:tc>
+                  <a:txBody>
+                    <a:bodyPr/>
+                    <a:lstStyle/>
+                    <a:p>
+                      <a:pPr marL="0" algn="ctr" defTabSz="914400" rtl="0" eaLnBrk="1" latinLnBrk="0" hangingPunct="1"/>
+                      <a:r>
+                        <a:rPr lang="en-US" sz="2400" kern="1200" dirty="0">
+                          <a:solidFill>
+                            <a:schemeClr val="dk1"/>
+                          </a:solidFill>
+                          <a:latin typeface="+mn-lt"/>
+                          <a:ea typeface="+mn-ea"/>
+                          <a:cs typeface="+mn-cs"/>
+                        </a:rPr>
+                        <a:t>95.3%</a:t>
+                      </a:r>
+                      <a:endParaRPr lang="en-IN" sz="2400" kern="1200" dirty="0">
+                        <a:solidFill>
+                          <a:schemeClr val="dk1"/>
+                        </a:solidFill>
+                        <a:latin typeface="+mn-lt"/>
+                        <a:ea typeface="+mn-ea"/>
+                        <a:cs typeface="+mn-cs"/>
+                      </a:endParaRPr>
+                    </a:p>
+                  </a:txBody>
+                  <a:tcPr/>
+                </a:tc>
+                <a:tc>
+                  <a:txBody>
+                    <a:bodyPr/>
+                    <a:lstStyle/>
+                    <a:p>
+                      <a:pPr marL="0" algn="ctr" defTabSz="914400" rtl="0" eaLnBrk="1" latinLnBrk="0" hangingPunct="1"/>
+                      <a:r>
+                        <a:rPr lang="en-US" sz="2400" kern="1200" dirty="0">
+                          <a:solidFill>
+                            <a:schemeClr val="dk1"/>
+                          </a:solidFill>
+                          <a:latin typeface="+mn-lt"/>
+                          <a:ea typeface="+mn-ea"/>
+                          <a:cs typeface="+mn-cs"/>
+                        </a:rPr>
+                        <a:t>92.3%</a:t>
+                      </a:r>
+                      <a:endParaRPr lang="en-IN" sz="2400" kern="1200" dirty="0">
+                        <a:solidFill>
+                          <a:schemeClr val="dk1"/>
+                        </a:solidFill>
+                        <a:latin typeface="+mn-lt"/>
+                        <a:ea typeface="+mn-ea"/>
+                        <a:cs typeface="+mn-cs"/>
+                      </a:endParaRPr>
+                    </a:p>
+                  </a:txBody>
+                  <a:tcPr/>
+                </a:tc>
+                <a:extLst>
+                  <a:ext uri="{0D108BD9-81ED-4DB2-BD59-A6C34878D82A}">
+                    <a16:rowId xmlns:a16="http://schemas.microsoft.com/office/drawing/2014/main" val="1581733964"/>
+                  </a:ext>
+                </a:extLst>
+              </a:tr>
+              <a:tr h="766000">
+                <a:tc>
+                  <a:txBody>
+                    <a:bodyPr/>
+                    <a:lstStyle/>
+                    <a:p>
+                      <a:pPr algn="ctr"/>
+                      <a:r>
+                        <a:rPr lang="en-US" sz="2400" b="1" kern="1200" dirty="0" err="1">
+                          <a:solidFill>
+                            <a:schemeClr val="tx1">
+                              <a:lumMod val="75000"/>
+                              <a:lumOff val="25000"/>
+                            </a:schemeClr>
+                          </a:solidFill>
+                          <a:latin typeface="+mn-lt"/>
+                          <a:ea typeface="+mn-ea"/>
+                          <a:cs typeface="+mn-cs"/>
+                        </a:rPr>
+                        <a:t>SqueezeNet</a:t>
+                      </a:r>
+                      <a:endParaRPr lang="en-IN" sz="2400" b="1" kern="1200" dirty="0">
+                        <a:solidFill>
+                          <a:schemeClr val="tx1">
+                            <a:lumMod val="75000"/>
+                            <a:lumOff val="25000"/>
+                          </a:schemeClr>
+                        </a:solidFill>
+                        <a:latin typeface="+mn-lt"/>
+                        <a:ea typeface="+mn-ea"/>
+                        <a:cs typeface="+mn-cs"/>
+                      </a:endParaRPr>
+                    </a:p>
+                  </a:txBody>
+                  <a:tcPr/>
+                </a:tc>
+                <a:tc>
+                  <a:txBody>
+                    <a:bodyPr/>
+                    <a:lstStyle/>
+                    <a:p>
+                      <a:pPr marL="0" algn="ctr" defTabSz="914400" rtl="0" eaLnBrk="1" latinLnBrk="0" hangingPunct="1"/>
+                      <a:r>
+                        <a:rPr lang="en-US" sz="2400" kern="1200" dirty="0">
+                          <a:solidFill>
+                            <a:schemeClr val="dk1"/>
+                          </a:solidFill>
+                          <a:latin typeface="+mn-lt"/>
+                          <a:ea typeface="+mn-ea"/>
+                          <a:cs typeface="+mn-cs"/>
+                        </a:rPr>
+                        <a:t>98.8%</a:t>
+                      </a:r>
+                      <a:endParaRPr lang="en-IN" sz="2400" kern="1200" dirty="0">
+                        <a:solidFill>
+                          <a:schemeClr val="dk1"/>
+                        </a:solidFill>
+                        <a:latin typeface="+mn-lt"/>
+                        <a:ea typeface="+mn-ea"/>
+                        <a:cs typeface="+mn-cs"/>
+                      </a:endParaRPr>
+                    </a:p>
+                  </a:txBody>
+                  <a:tcPr/>
+                </a:tc>
+                <a:tc>
+                  <a:txBody>
+                    <a:bodyPr/>
+                    <a:lstStyle/>
+                    <a:p>
+                      <a:pPr marL="0" algn="ctr" defTabSz="914400" rtl="0" eaLnBrk="1" latinLnBrk="0" hangingPunct="1"/>
+                      <a:r>
+                        <a:rPr lang="en-US" sz="2400" kern="1200" dirty="0">
+                          <a:solidFill>
+                            <a:schemeClr val="dk1"/>
+                          </a:solidFill>
+                          <a:latin typeface="+mn-lt"/>
+                          <a:ea typeface="+mn-ea"/>
+                          <a:cs typeface="+mn-cs"/>
+                        </a:rPr>
+                        <a:t>93%</a:t>
+                      </a:r>
+                      <a:endParaRPr lang="en-IN" sz="2400" kern="1200" dirty="0">
+                        <a:solidFill>
+                          <a:schemeClr val="dk1"/>
+                        </a:solidFill>
+                        <a:latin typeface="+mn-lt"/>
+                        <a:ea typeface="+mn-ea"/>
+                        <a:cs typeface="+mn-cs"/>
+                      </a:endParaRPr>
+                    </a:p>
+                  </a:txBody>
+                  <a:tcPr/>
+                </a:tc>
+                <a:tc>
+                  <a:txBody>
+                    <a:bodyPr/>
+                    <a:lstStyle/>
+                    <a:p>
+                      <a:pPr marL="0" algn="ctr" defTabSz="914400" rtl="0" eaLnBrk="1" latinLnBrk="0" hangingPunct="1"/>
+                      <a:r>
+                        <a:rPr lang="en-US" sz="2400" kern="1200" dirty="0">
+                          <a:solidFill>
+                            <a:schemeClr val="dk1"/>
+                          </a:solidFill>
+                          <a:latin typeface="+mn-lt"/>
+                          <a:ea typeface="+mn-ea"/>
+                          <a:cs typeface="+mn-cs"/>
+                        </a:rPr>
+                        <a:t>90.4%</a:t>
+                      </a:r>
+                      <a:endParaRPr lang="en-IN" sz="2400" kern="1200" dirty="0">
+                        <a:solidFill>
+                          <a:schemeClr val="dk1"/>
+                        </a:solidFill>
+                        <a:latin typeface="+mn-lt"/>
+                        <a:ea typeface="+mn-ea"/>
+                        <a:cs typeface="+mn-cs"/>
+                      </a:endParaRPr>
+                    </a:p>
+                  </a:txBody>
+                  <a:tcPr/>
+                </a:tc>
+                <a:extLst>
+                  <a:ext uri="{0D108BD9-81ED-4DB2-BD59-A6C34878D82A}">
+                    <a16:rowId xmlns:a16="http://schemas.microsoft.com/office/drawing/2014/main" val="2290382939"/>
+                  </a:ext>
+                </a:extLst>
+              </a:tr>
+              <a:tr h="766000">
+                <a:tc>
+                  <a:txBody>
+                    <a:bodyPr/>
+                    <a:lstStyle/>
+                    <a:p>
+                      <a:pPr marL="0" algn="ctr" defTabSz="914400" rtl="0" eaLnBrk="1" latinLnBrk="0" hangingPunct="1"/>
+                      <a:r>
+                        <a:rPr lang="en-US" sz="2400" b="1" kern="1200" dirty="0">
+                          <a:solidFill>
+                            <a:schemeClr val="tx1">
+                              <a:lumMod val="75000"/>
+                              <a:lumOff val="25000"/>
+                            </a:schemeClr>
+                          </a:solidFill>
+                          <a:latin typeface="+mn-lt"/>
+                          <a:ea typeface="+mn-ea"/>
+                          <a:cs typeface="+mn-cs"/>
+                        </a:rPr>
+                        <a:t>ResNet18</a:t>
+                      </a:r>
+                      <a:endParaRPr lang="en-IN" sz="2400" b="1" kern="1200" dirty="0">
+                        <a:solidFill>
+                          <a:schemeClr val="tx1">
+                            <a:lumMod val="75000"/>
+                            <a:lumOff val="25000"/>
+                          </a:schemeClr>
+                        </a:solidFill>
+                        <a:latin typeface="+mn-lt"/>
+                        <a:ea typeface="+mn-ea"/>
+                        <a:cs typeface="+mn-cs"/>
+                      </a:endParaRPr>
+                    </a:p>
+                  </a:txBody>
+                  <a:tcPr/>
+                </a:tc>
+                <a:tc>
+                  <a:txBody>
+                    <a:bodyPr/>
+                    <a:lstStyle/>
+                    <a:p>
+                      <a:pPr marL="0" algn="ctr" defTabSz="914400" rtl="0" eaLnBrk="1" latinLnBrk="0" hangingPunct="1"/>
+                      <a:r>
+                        <a:rPr lang="en-US" sz="2400" kern="1200" dirty="0">
+                          <a:solidFill>
+                            <a:schemeClr val="dk1"/>
+                          </a:solidFill>
+                          <a:latin typeface="+mn-lt"/>
+                          <a:ea typeface="+mn-ea"/>
+                          <a:cs typeface="+mn-cs"/>
+                        </a:rPr>
+                        <a:t>99.3%</a:t>
+                      </a:r>
+                      <a:endParaRPr lang="en-IN" sz="2400" kern="1200" dirty="0">
+                        <a:solidFill>
+                          <a:schemeClr val="dk1"/>
+                        </a:solidFill>
+                        <a:latin typeface="+mn-lt"/>
+                        <a:ea typeface="+mn-ea"/>
+                        <a:cs typeface="+mn-cs"/>
+                      </a:endParaRPr>
+                    </a:p>
+                  </a:txBody>
+                  <a:tcPr/>
+                </a:tc>
+                <a:tc>
+                  <a:txBody>
+                    <a:bodyPr/>
+                    <a:lstStyle/>
+                    <a:p>
+                      <a:pPr marL="0" algn="ctr" defTabSz="914400" rtl="0" eaLnBrk="1" latinLnBrk="0" hangingPunct="1"/>
+                      <a:r>
+                        <a:rPr lang="en-US" sz="2400" kern="1200" dirty="0">
+                          <a:solidFill>
+                            <a:schemeClr val="dk1"/>
+                          </a:solidFill>
+                          <a:latin typeface="+mn-lt"/>
+                          <a:ea typeface="+mn-ea"/>
+                          <a:cs typeface="+mn-cs"/>
+                        </a:rPr>
+                        <a:t>97.7%</a:t>
+                      </a:r>
+                      <a:endParaRPr lang="en-IN" sz="2400" kern="1200" dirty="0">
+                        <a:solidFill>
+                          <a:schemeClr val="dk1"/>
+                        </a:solidFill>
+                        <a:latin typeface="+mn-lt"/>
+                        <a:ea typeface="+mn-ea"/>
+                        <a:cs typeface="+mn-cs"/>
+                      </a:endParaRPr>
+                    </a:p>
+                  </a:txBody>
+                  <a:tcPr/>
+                </a:tc>
+                <a:tc>
+                  <a:txBody>
+                    <a:bodyPr/>
+                    <a:lstStyle/>
+                    <a:p>
+                      <a:pPr marL="0" algn="ctr" defTabSz="914400" rtl="0" eaLnBrk="1" latinLnBrk="0" hangingPunct="1"/>
+                      <a:r>
+                        <a:rPr lang="en-US" sz="2400" kern="1200" dirty="0">
+                          <a:solidFill>
+                            <a:schemeClr val="dk1"/>
+                          </a:solidFill>
+                          <a:latin typeface="+mn-lt"/>
+                          <a:ea typeface="+mn-ea"/>
+                          <a:cs typeface="+mn-cs"/>
+                        </a:rPr>
+                        <a:t>98.1%</a:t>
+                      </a:r>
+                      <a:endParaRPr lang="en-IN" sz="2400" kern="1200" dirty="0">
+                        <a:solidFill>
+                          <a:schemeClr val="dk1"/>
+                        </a:solidFill>
+                        <a:latin typeface="+mn-lt"/>
+                        <a:ea typeface="+mn-ea"/>
+                        <a:cs typeface="+mn-cs"/>
+                      </a:endParaRPr>
+                    </a:p>
+                  </a:txBody>
+                  <a:tcPr/>
+                </a:tc>
+                <a:extLst>
+                  <a:ext uri="{0D108BD9-81ED-4DB2-BD59-A6C34878D82A}">
+                    <a16:rowId xmlns:a16="http://schemas.microsoft.com/office/drawing/2014/main" val="850371273"/>
+                  </a:ext>
+                </a:extLst>
+              </a:tr>
+              <a:tr h="766000">
+                <a:tc>
+                  <a:txBody>
+                    <a:bodyPr/>
+                    <a:lstStyle/>
+                    <a:p>
+                      <a:pPr marL="0" algn="ctr" defTabSz="914400" rtl="0" eaLnBrk="1" latinLnBrk="0" hangingPunct="1"/>
+                      <a:r>
+                        <a:rPr lang="en-US" sz="2400" b="1" kern="1200" dirty="0">
+                          <a:solidFill>
+                            <a:schemeClr val="tx1">
+                              <a:lumMod val="75000"/>
+                              <a:lumOff val="25000"/>
+                            </a:schemeClr>
+                          </a:solidFill>
+                          <a:latin typeface="+mn-lt"/>
+                          <a:ea typeface="+mn-ea"/>
+                          <a:cs typeface="+mn-cs"/>
+                        </a:rPr>
+                        <a:t>VGG16</a:t>
+                      </a:r>
+                      <a:endParaRPr lang="en-IN" sz="2400" b="1" kern="1200" dirty="0">
+                        <a:solidFill>
+                          <a:schemeClr val="tx1">
+                            <a:lumMod val="75000"/>
+                            <a:lumOff val="25000"/>
+                          </a:schemeClr>
+                        </a:solidFill>
+                        <a:latin typeface="+mn-lt"/>
+                        <a:ea typeface="+mn-ea"/>
+                        <a:cs typeface="+mn-cs"/>
+                      </a:endParaRPr>
+                    </a:p>
+                  </a:txBody>
+                  <a:tcPr/>
+                </a:tc>
+                <a:tc>
+                  <a:txBody>
+                    <a:bodyPr/>
+                    <a:lstStyle/>
+                    <a:p>
+                      <a:pPr marL="0" algn="ctr" defTabSz="914400" rtl="0" eaLnBrk="1" latinLnBrk="0" hangingPunct="1"/>
+                      <a:r>
+                        <a:rPr lang="en-US" sz="2400" kern="1200" dirty="0">
+                          <a:solidFill>
+                            <a:schemeClr val="dk1"/>
+                          </a:solidFill>
+                          <a:latin typeface="+mn-lt"/>
+                          <a:ea typeface="+mn-ea"/>
+                          <a:cs typeface="+mn-cs"/>
+                        </a:rPr>
+                        <a:t>98.1%</a:t>
+                      </a:r>
+                      <a:endParaRPr lang="en-IN" sz="2400" kern="1200" dirty="0">
+                        <a:solidFill>
+                          <a:schemeClr val="dk1"/>
+                        </a:solidFill>
+                        <a:latin typeface="+mn-lt"/>
+                        <a:ea typeface="+mn-ea"/>
+                        <a:cs typeface="+mn-cs"/>
+                      </a:endParaRPr>
+                    </a:p>
+                  </a:txBody>
+                  <a:tcPr/>
+                </a:tc>
+                <a:tc>
+                  <a:txBody>
+                    <a:bodyPr/>
+                    <a:lstStyle/>
+                    <a:p>
+                      <a:pPr marL="0" algn="ctr" defTabSz="914400" rtl="0" eaLnBrk="1" latinLnBrk="0" hangingPunct="1"/>
+                      <a:r>
+                        <a:rPr lang="en-US" sz="2400" kern="1200" dirty="0">
+                          <a:solidFill>
+                            <a:schemeClr val="dk1"/>
+                          </a:solidFill>
+                          <a:latin typeface="+mn-lt"/>
+                          <a:ea typeface="+mn-ea"/>
+                          <a:cs typeface="+mn-cs"/>
+                        </a:rPr>
+                        <a:t>97.7%</a:t>
+                      </a:r>
+                      <a:endParaRPr lang="en-IN" sz="2400" kern="1200" dirty="0">
+                        <a:solidFill>
+                          <a:schemeClr val="dk1"/>
+                        </a:solidFill>
+                        <a:latin typeface="+mn-lt"/>
+                        <a:ea typeface="+mn-ea"/>
+                        <a:cs typeface="+mn-cs"/>
+                      </a:endParaRPr>
+                    </a:p>
+                  </a:txBody>
+                  <a:tcPr/>
+                </a:tc>
+                <a:tc>
+                  <a:txBody>
+                    <a:bodyPr/>
+                    <a:lstStyle/>
+                    <a:p>
+                      <a:pPr marL="0" algn="ctr" defTabSz="914400" rtl="0" eaLnBrk="1" latinLnBrk="0" hangingPunct="1"/>
+                      <a:r>
+                        <a:rPr lang="en-US" sz="2400" kern="1200" dirty="0">
+                          <a:solidFill>
+                            <a:schemeClr val="dk1"/>
+                          </a:solidFill>
+                          <a:latin typeface="+mn-lt"/>
+                          <a:ea typeface="+mn-ea"/>
+                          <a:cs typeface="+mn-cs"/>
+                        </a:rPr>
+                        <a:t>98.1%</a:t>
+                      </a:r>
+                      <a:endParaRPr lang="en-IN" sz="2400" kern="1200" dirty="0">
+                        <a:solidFill>
+                          <a:schemeClr val="dk1"/>
+                        </a:solidFill>
+                        <a:latin typeface="+mn-lt"/>
+                        <a:ea typeface="+mn-ea"/>
+                        <a:cs typeface="+mn-cs"/>
+                      </a:endParaRPr>
+                    </a:p>
+                  </a:txBody>
+                  <a:tcPr/>
+                </a:tc>
+                <a:extLst>
+                  <a:ext uri="{0D108BD9-81ED-4DB2-BD59-A6C34878D82A}">
+                    <a16:rowId xmlns:a16="http://schemas.microsoft.com/office/drawing/2014/main" val="2697793130"/>
+                  </a:ext>
+                </a:extLst>
+              </a:tr>
+            </a:tbl>
+          </a:graphicData>
+        </a:graphic>
+      </p:graphicFrame>
+      <p:sp>
+        <p:nvSpPr>
+          <p:cNvPr id="12" name="TextBox 11">
+            <a:extLst>
+              <a:ext uri="{FF2B5EF4-FFF2-40B4-BE49-F238E27FC236}">
+                <a16:creationId xmlns:a16="http://schemas.microsoft.com/office/drawing/2014/main" id="{8629347B-620C-48F7-9357-A8091DBD62FA}"/>
+              </a:ext>
+            </a:extLst>
+          </p:cNvPr>
+          <p:cNvSpPr txBox="1"/>
+          <p:nvPr/>
         </p:nvSpPr>
         <p:spPr>
-          <a:xfrm>
-            <a:off x="838200" y="477520"/>
-            <a:ext cx="10515600" cy="5699443"/>
+          <a:xfrm flipH="1">
+            <a:off x="4226560" y="5598160"/>
+            <a:ext cx="7183120" cy="369332"/>
           </a:xfrm>
+          <a:prstGeom prst="rect">
+            <a:avLst/>
+          </a:prstGeom>
+          <a:noFill/>
         </p:spPr>
         <p:txBody>
-          <a:bodyPr/>
+          <a:bodyPr wrap="square" rtlCol="0">
+            <a:spAutoFit/>
+          </a:bodyPr>
           <a:lstStyle/>
           <a:p>
             <a:r>
               <a:rPr lang="en-US" dirty="0"/>
-              <a:t>Until the forward function of a variable is called, there exists no node for the variable in the graph.</a:t>
-            </a:r>
-          </a:p>
-          <a:p>
-            <a:r>
-              <a:rPr lang="en-GB" dirty="0"/>
-              <a:t>When you call </a:t>
-            </a:r>
-            <a:r>
-              <a:rPr lang="en-GB" i="1" dirty="0"/>
-              <a:t>backward()</a:t>
-            </a:r>
-            <a:r>
-              <a:rPr lang="en-GB" dirty="0"/>
-              <a:t>, as the gradients are computed, these buffers are essentially freed, and the graph is destroyed</a:t>
-            </a:r>
-          </a:p>
-          <a:p>
-            <a:r>
-              <a:rPr lang="en-GB" dirty="0"/>
-              <a:t>This is in contrast to the </a:t>
-            </a:r>
-            <a:r>
-              <a:rPr lang="en-GB" b="1" dirty="0"/>
-              <a:t>Static Computation Graphs</a:t>
-            </a:r>
-            <a:r>
-              <a:rPr lang="en-GB" dirty="0"/>
-              <a:t>, used by TensorFlow where the graph is declared </a:t>
-            </a:r>
-            <a:r>
-              <a:rPr lang="en-GB" b="1" i="1" dirty="0"/>
-              <a:t>before</a:t>
-            </a:r>
-            <a:r>
-              <a:rPr lang="en-GB" dirty="0"/>
-              <a:t> </a:t>
-            </a:r>
-            <a:r>
-              <a:rPr lang="en-GB" b="1" dirty="0"/>
-              <a:t>running</a:t>
-            </a:r>
-            <a:r>
-              <a:rPr lang="en-GB" dirty="0"/>
-              <a:t> the program.</a:t>
-            </a:r>
-          </a:p>
-          <a:p>
-            <a:r>
-              <a:rPr lang="en-GB" dirty="0"/>
-              <a:t> The dynamic graph paradigm allows you to </a:t>
-            </a:r>
-            <a:r>
-              <a:rPr lang="en-GB" b="1" dirty="0"/>
-              <a:t>make changes</a:t>
-            </a:r>
-            <a:r>
-              <a:rPr lang="en-GB" dirty="0"/>
-              <a:t> to your network architecture </a:t>
-            </a:r>
-            <a:r>
-              <a:rPr lang="en-GB" b="1" dirty="0"/>
-              <a:t>during</a:t>
-            </a:r>
-            <a:r>
-              <a:rPr lang="en-GB" i="1" dirty="0"/>
-              <a:t> </a:t>
-            </a:r>
-            <a:r>
-              <a:rPr lang="en-GB" b="1" dirty="0"/>
-              <a:t>runtime</a:t>
-            </a:r>
-            <a:r>
-              <a:rPr lang="en-GB" dirty="0"/>
-              <a:t>, as a graph is created only when a piece of code is run. </a:t>
-            </a:r>
-          </a:p>
-          <a:p>
-            <a:r>
-              <a:rPr lang="en-GB" dirty="0"/>
-              <a:t>This means a graph may be redefined during the lifetime for a program. </a:t>
+              <a:t>* All accuracies mentioned are based on epoch for best validation accuracy</a:t>
             </a:r>
             <a:endParaRPr lang="en-IN" dirty="0"/>
           </a:p>
@@ -8807,7 +10480,7 @@
     </p:spTree>
     <p:extLst>
       <p:ext uri="{BB962C8B-B14F-4D97-AF65-F5344CB8AC3E}">
-        <p14:creationId xmlns:p14="http://schemas.microsoft.com/office/powerpoint/2010/main" val="1690372758"/>
+        <p14:creationId xmlns:p14="http://schemas.microsoft.com/office/powerpoint/2010/main" val="3615301423"/>
       </p:ext>
     </p:extLst>
   </p:cSld>
@@ -8836,10 +10509,10 @@
       </p:grpSpPr>
       <p:sp>
         <p:nvSpPr>
-          <p:cNvPr id="3" name="Content Placeholder 2">
-            <a:extLst>
-              <a:ext uri="{FF2B5EF4-FFF2-40B4-BE49-F238E27FC236}">
-                <a16:creationId xmlns:a16="http://schemas.microsoft.com/office/drawing/2014/main" id="{AED86A88-AB4A-4082-91B5-6DA1252980D9}"/>
+          <p:cNvPr id="2" name="Title 1">
+            <a:extLst>
+              <a:ext uri="{FF2B5EF4-FFF2-40B4-BE49-F238E27FC236}">
+                <a16:creationId xmlns:a16="http://schemas.microsoft.com/office/drawing/2014/main" id="{BB84A478-05F9-4CCE-9830-CDEC4B2ADBDC}"/>
               </a:ext>
             </a:extLst>
           </p:cNvPr>
@@ -8847,79 +10520,139 @@
             <a:spLocks noGrp="1"/>
           </p:cNvSpPr>
           <p:nvPr>
-            <p:ph idx="1"/>
+            <p:ph type="title"/>
           </p:nvPr>
         </p:nvSpPr>
         <p:spPr>
           <a:xfrm>
-            <a:off x="838200" y="619760"/>
-            <a:ext cx="10515600" cy="5557203"/>
+            <a:off x="838200" y="365125"/>
+            <a:ext cx="10515600" cy="1077595"/>
           </a:xfrm>
         </p:spPr>
         <p:txBody>
           <a:bodyPr/>
           <a:lstStyle/>
           <a:p>
-            <a:pPr marL="0" indent="0">
-              <a:buNone/>
-            </a:pPr>
-            <a:r>
-              <a:rPr lang="en-US" b="1" dirty="0"/>
-              <a:t>Difference #2: Data Parallelism</a:t>
-            </a:r>
-          </a:p>
-          <a:p>
-            <a:r>
-              <a:rPr lang="en-US" dirty="0"/>
-              <a:t>TensorFlow allows fine tuning of every operation to be run on specific devices.</a:t>
-            </a:r>
-          </a:p>
-          <a:p>
-            <a:r>
-              <a:rPr lang="en-US" dirty="0"/>
-              <a:t>Nonetheless, achieving parallelism is more manual and requires thought.</a:t>
-            </a:r>
-          </a:p>
-          <a:p>
+            <a:r>
+              <a:rPr lang="en-US" dirty="0"/>
+              <a:t>Comparison of </a:t>
+            </a:r>
             <a:r>
               <a:rPr lang="en-US" dirty="0" err="1"/>
               <a:t>PyTorch</a:t>
             </a:r>
             <a:r>
               <a:rPr lang="en-US" dirty="0"/>
-              <a:t> allows us to wrap any module using “</a:t>
-            </a:r>
-            <a:r>
-              <a:rPr lang="en-US" dirty="0" err="1"/>
-              <a:t>torch.nn.Dataparallel</a:t>
-            </a:r>
-            <a:r>
-              <a:rPr lang="en-US" dirty="0"/>
-              <a:t>” and it will parallelized. This is called </a:t>
-            </a:r>
+              <a:t> And TensorFlow</a:t>
+            </a:r>
+            <a:endParaRPr lang="en-IN" dirty="0"/>
+          </a:p>
+        </p:txBody>
+      </p:sp>
+      <p:sp>
+        <p:nvSpPr>
+          <p:cNvPr id="3" name="Content Placeholder 2">
+            <a:extLst>
+              <a:ext uri="{FF2B5EF4-FFF2-40B4-BE49-F238E27FC236}">
+                <a16:creationId xmlns:a16="http://schemas.microsoft.com/office/drawing/2014/main" id="{27BED44B-E532-4C50-977A-A25758303994}"/>
+              </a:ext>
+            </a:extLst>
+          </p:cNvPr>
+          <p:cNvSpPr>
+            <a:spLocks noGrp="1"/>
+          </p:cNvSpPr>
+          <p:nvPr>
+            <p:ph idx="1"/>
+          </p:nvPr>
+        </p:nvSpPr>
+        <p:spPr>
+          <a:xfrm>
+            <a:off x="838200" y="1442720"/>
+            <a:ext cx="10515600" cy="4734243"/>
+          </a:xfrm>
+        </p:spPr>
+        <p:txBody>
+          <a:bodyPr/>
+          <a:lstStyle/>
+          <a:p>
+            <a:pPr marL="0" indent="0">
+              <a:buNone/>
+            </a:pPr>
             <a:r>
               <a:rPr lang="en-US" b="1" dirty="0"/>
-              <a:t>Declarative Data Parallelism</a:t>
-            </a:r>
-          </a:p>
-          <a:p>
-            <a:r>
-              <a:rPr lang="en-US" dirty="0"/>
-              <a:t>This way we can leverage multiple GPU’s with no effort</a:t>
+              <a:t>Difference #1: Dynamic Vs Static graph definition</a:t>
+            </a:r>
+          </a:p>
+          <a:p>
+            <a:r>
+              <a:rPr lang="en-GB" dirty="0"/>
+              <a:t>Both frameworks operate on tensors and view any model as a directed acyclic graph (DAG), but they differ drastically on how you can define them.</a:t>
+            </a:r>
+          </a:p>
+          <a:p>
+            <a:r>
+              <a:rPr lang="en-GB" dirty="0"/>
+              <a:t>In TensorFlow, one has to define graph </a:t>
+            </a:r>
+            <a:r>
+              <a:rPr lang="en-GB" b="1" dirty="0"/>
+              <a:t>statically</a:t>
+            </a:r>
+            <a:r>
+              <a:rPr lang="en-GB" dirty="0"/>
+              <a:t> before a model can run. All communication with outer world is performed via </a:t>
+            </a:r>
+            <a:r>
+              <a:rPr lang="en-GB" dirty="0" err="1"/>
+              <a:t>tf.Session</a:t>
+            </a:r>
+            <a:r>
+              <a:rPr lang="en-GB" dirty="0"/>
+              <a:t> and </a:t>
+            </a:r>
+            <a:r>
+              <a:rPr lang="en-GB" dirty="0" err="1"/>
+              <a:t>tf.Placeholder</a:t>
+            </a:r>
+            <a:r>
+              <a:rPr lang="en-GB" dirty="0"/>
+              <a:t> Such a pain, isn’t it?</a:t>
+            </a:r>
+          </a:p>
+          <a:p>
+            <a:r>
+              <a:rPr lang="en-GB" dirty="0"/>
+              <a:t>In </a:t>
+            </a:r>
+            <a:r>
+              <a:rPr lang="en-GB" dirty="0" err="1"/>
+              <a:t>PyTorch</a:t>
+            </a:r>
+            <a:r>
+              <a:rPr lang="en-GB" dirty="0"/>
+              <a:t> things are way more imperative and </a:t>
+            </a:r>
+            <a:r>
+              <a:rPr lang="en-GB" b="1" dirty="0"/>
+              <a:t>dynamic</a:t>
+            </a:r>
+            <a:r>
+              <a:rPr lang="en-GB" dirty="0"/>
+              <a:t>: you can define, change and execute nodes as you go, no special session interfaces or placeholders. </a:t>
             </a:r>
           </a:p>
           <a:p>
             <a:endParaRPr lang="en-US" dirty="0"/>
           </a:p>
           <a:p>
-            <a:endParaRPr lang="en-IN" dirty="0"/>
+            <a:endParaRPr lang="en-IN" b="1" dirty="0"/>
           </a:p>
         </p:txBody>
       </p:sp>
     </p:spTree>
     <p:extLst>
       <p:ext uri="{BB962C8B-B14F-4D97-AF65-F5344CB8AC3E}">
-        <p14:creationId xmlns:p14="http://schemas.microsoft.com/office/powerpoint/2010/main" val="2664390709"/>
+        <p14:creationId xmlns:p14="http://schemas.microsoft.com/office/powerpoint/2010/main" val="3759910449"/>
       </p:ext>
     </p:extLst>
   </p:cSld>
@@ -9002,15 +10735,26 @@
           <a:p>
             <a:r>
               <a:rPr lang="en-US" dirty="0"/>
-              <a:t>We need to multiply each node/neuron with a weight and also add the bias (y =</a:t>
+              <a:t>The base class for all neural network modules is </a:t>
             </a:r>
             <a:r>
               <a:rPr lang="en-US" dirty="0" err="1"/>
-              <a:t>Ax+b</a:t>
-            </a:r>
-            <a:r>
-              <a:rPr lang="en-US" dirty="0"/>
-              <a:t>)</a:t>
+              <a:t>torch.nn.Module</a:t>
+            </a:r>
+            <a:endParaRPr lang="en-US" dirty="0"/>
+          </a:p>
+          <a:p>
+            <a:r>
+              <a:rPr lang="en-US" dirty="0"/>
+              <a:t>At each node/neuron, the operation is given by (y =</a:t>
+            </a:r>
+            <a:r>
+              <a:rPr lang="en-US" dirty="0" err="1"/>
+              <a:t>Wx+b</a:t>
+            </a:r>
+            <a:r>
+              <a:rPr lang="en-US" dirty="0"/>
+              <a:t>), where W is the weights and b is the bias</a:t>
             </a:r>
           </a:p>
           <a:p>
@@ -9022,17 +10766,6 @@
               <a:rPr lang="en-US" dirty="0"/>
               <a:t> applies linear transformation to the incoming data</a:t>
             </a:r>
-          </a:p>
-          <a:p>
-            <a:r>
-              <a:rPr lang="en-US" dirty="0"/>
-              <a:t>The base class for all neural network modules is </a:t>
-            </a:r>
-            <a:r>
-              <a:rPr lang="en-US" dirty="0" err="1"/>
-              <a:t>torch.nn.Module</a:t>
-            </a:r>
-            <a:endParaRPr lang="en-US" dirty="0"/>
           </a:p>
           <a:p>
             <a:r>
@@ -9083,7 +10816,7 @@
           <p:cNvPr id="3" name="Content Placeholder 2">
             <a:extLst>
               <a:ext uri="{FF2B5EF4-FFF2-40B4-BE49-F238E27FC236}">
-                <a16:creationId xmlns:a16="http://schemas.microsoft.com/office/drawing/2014/main" id="{809AE9DA-3D66-427B-825D-EF7926112F5B}"/>
+                <a16:creationId xmlns:a16="http://schemas.microsoft.com/office/drawing/2014/main" id="{FC1DC2BD-0C97-4FD4-8C6B-E0FBEAD109A8}"/>
               </a:ext>
             </a:extLst>
           </p:cNvPr>
@@ -9096,76 +10829,98 @@
         </p:nvSpPr>
         <p:spPr>
           <a:xfrm>
-            <a:off x="838200" y="457200"/>
-            <a:ext cx="10515600" cy="5719763"/>
+            <a:off x="838200" y="477520"/>
+            <a:ext cx="10515600" cy="5699443"/>
           </a:xfrm>
         </p:spPr>
         <p:txBody>
           <a:bodyPr/>
           <a:lstStyle/>
           <a:p>
-            <a:pPr marL="0" indent="0">
-              <a:buNone/>
-            </a:pPr>
-            <a:r>
-              <a:rPr lang="en-US" b="1" dirty="0"/>
-              <a:t>Difference #3: Debugging</a:t>
-            </a:r>
-          </a:p>
-          <a:p>
-            <a:r>
-              <a:rPr lang="en-US" dirty="0"/>
-              <a:t>TensorFlow provides a special tool called “</a:t>
-            </a:r>
-            <a:r>
-              <a:rPr lang="en-US" dirty="0" err="1"/>
-              <a:t>tfdbg</a:t>
-            </a:r>
-            <a:r>
-              <a:rPr lang="en-US" dirty="0"/>
-              <a:t>” which allows to evaluate TensorFlow expressions at runtime in a specific session scope.</a:t>
-            </a:r>
-          </a:p>
-          <a:p>
-            <a:r>
-              <a:rPr lang="en-US" dirty="0"/>
-              <a:t>However, no tool is provided to debug the python code.</a:t>
-            </a:r>
-          </a:p>
-          <a:p>
-            <a:r>
-              <a:rPr lang="en-US" dirty="0"/>
-              <a:t>However, as computation graph in </a:t>
-            </a:r>
-            <a:r>
-              <a:rPr lang="en-US" dirty="0" err="1"/>
-              <a:t>PyTorch</a:t>
-            </a:r>
-            <a:r>
-              <a:rPr lang="en-US" dirty="0"/>
-              <a:t> is defined at runtime you can use any of the python debugging tools like </a:t>
-            </a:r>
-            <a:r>
-              <a:rPr lang="en-US" dirty="0" err="1"/>
-              <a:t>pdb</a:t>
-            </a:r>
-            <a:r>
-              <a:rPr lang="en-US" dirty="0"/>
-              <a:t>, </a:t>
-            </a:r>
-            <a:r>
-              <a:rPr lang="en-US" dirty="0" err="1"/>
-              <a:t>ipdb</a:t>
-            </a:r>
-            <a:r>
-              <a:rPr lang="en-US" dirty="0"/>
-              <a:t>, PyCharm debugger either.</a:t>
-            </a:r>
-          </a:p>
-          <a:p>
-            <a:pPr marL="0" indent="0">
-              <a:buNone/>
-            </a:pPr>
+            <a:r>
+              <a:rPr lang="en-US" dirty="0"/>
+              <a:t>Until the forward function of a variable is called, there exists no node for the variable in the graph.</a:t>
+            </a:r>
+          </a:p>
+          <a:p>
+            <a:r>
+              <a:rPr lang="en-GB" dirty="0"/>
+              <a:t>When you call </a:t>
+            </a:r>
+            <a:r>
+              <a:rPr lang="en-GB" i="1" dirty="0"/>
+              <a:t>backward()</a:t>
+            </a:r>
+            <a:r>
+              <a:rPr lang="en-GB" dirty="0"/>
+              <a:t>, as the gradients are computed, these buffers are essentially freed, and the graph is destroyed</a:t>
+            </a:r>
+          </a:p>
+          <a:p>
+            <a:r>
+              <a:rPr lang="en-GB" dirty="0"/>
+              <a:t>This is in contrast to the </a:t>
+            </a:r>
+            <a:r>
+              <a:rPr lang="en-GB" b="1" dirty="0"/>
+              <a:t>Static Computation Graphs</a:t>
+            </a:r>
+            <a:r>
+              <a:rPr lang="en-GB" dirty="0"/>
+              <a:t>, used by TensorFlow where the graph is declared </a:t>
+            </a:r>
+            <a:r>
+              <a:rPr lang="en-GB" b="1" i="1" dirty="0"/>
+              <a:t>before</a:t>
+            </a:r>
+            <a:r>
+              <a:rPr lang="en-GB" dirty="0"/>
+              <a:t> </a:t>
+            </a:r>
+            <a:r>
+              <a:rPr lang="en-GB" b="1" dirty="0"/>
+              <a:t>running</a:t>
+            </a:r>
+            <a:r>
+              <a:rPr lang="en-GB" dirty="0"/>
+              <a:t> the program.</a:t>
+            </a:r>
+          </a:p>
+          <a:p>
+            <a:r>
+              <a:rPr lang="en-GB" dirty="0"/>
+              <a:t> The dynamic graph paradigm allows you to </a:t>
+            </a:r>
+            <a:r>
+              <a:rPr lang="en-GB" b="1" dirty="0"/>
+              <a:t>make changes</a:t>
+            </a:r>
+            <a:r>
+              <a:rPr lang="en-GB" dirty="0"/>
+              <a:t> to your network architecture </a:t>
+            </a:r>
+            <a:r>
+              <a:rPr lang="en-GB" b="1" dirty="0"/>
+              <a:t>during</a:t>
+            </a:r>
+            <a:r>
+              <a:rPr lang="en-GB" i="1" dirty="0"/>
+              <a:t> </a:t>
+            </a:r>
+            <a:r>
+              <a:rPr lang="en-GB" b="1" dirty="0"/>
+              <a:t>runtime</a:t>
+            </a:r>
+            <a:r>
+              <a:rPr lang="en-GB" dirty="0"/>
+              <a:t>, as a graph is created only when a piece of code is run. </a:t>
+            </a:r>
+          </a:p>
+          <a:p>
+            <a:r>
+              <a:rPr lang="en-GB" dirty="0"/>
+              <a:t>This means a graph may be redefined during the lifetime for a program. </a:t>
+            </a:r>
             <a:endParaRPr lang="en-IN" dirty="0"/>
           </a:p>
         </p:txBody>
@@ -9173,7 +10928,7 @@
     </p:spTree>
     <p:extLst>
       <p:ext uri="{BB962C8B-B14F-4D97-AF65-F5344CB8AC3E}">
-        <p14:creationId xmlns:p14="http://schemas.microsoft.com/office/powerpoint/2010/main" val="1828502175"/>
+        <p14:creationId xmlns:p14="http://schemas.microsoft.com/office/powerpoint/2010/main" val="1690372758"/>
       </p:ext>
     </p:extLst>
   </p:cSld>
@@ -9205,7 +10960,7 @@
           <p:cNvPr id="3" name="Content Placeholder 2">
             <a:extLst>
               <a:ext uri="{FF2B5EF4-FFF2-40B4-BE49-F238E27FC236}">
-                <a16:creationId xmlns:a16="http://schemas.microsoft.com/office/drawing/2014/main" id="{24580A68-C6F0-4E51-9A88-D84BF574EA65}"/>
+                <a16:creationId xmlns:a16="http://schemas.microsoft.com/office/drawing/2014/main" id="{AED86A88-AB4A-4082-91B5-6DA1252980D9}"/>
               </a:ext>
             </a:extLst>
           </p:cNvPr>
@@ -9218,8 +10973,8 @@
         </p:nvSpPr>
         <p:spPr>
           <a:xfrm>
-            <a:off x="838200" y="457200"/>
-            <a:ext cx="10515600" cy="5719763"/>
+            <a:off x="838200" y="619760"/>
+            <a:ext cx="10515600" cy="5557203"/>
           </a:xfrm>
         </p:spPr>
         <p:txBody>
@@ -9231,35 +10986,19 @@
             </a:pPr>
             <a:r>
               <a:rPr lang="en-US" b="1" dirty="0"/>
-              <a:t>Difference #4: Visualization</a:t>
-            </a:r>
-          </a:p>
-          <a:p>
-            <a:r>
-              <a:rPr lang="en-US" dirty="0" err="1"/>
-              <a:t>TensorBoard</a:t>
-            </a:r>
-            <a:r>
-              <a:rPr lang="en-US" dirty="0"/>
-              <a:t>, visualization tool in TensorFlow is very useful when it comes to comparison of different training runs</a:t>
-            </a:r>
-          </a:p>
-          <a:p>
-            <a:r>
-              <a:rPr lang="en-US" dirty="0" err="1"/>
-              <a:t>TensorBoard</a:t>
-            </a:r>
-            <a:r>
-              <a:rPr lang="en-US" dirty="0"/>
-              <a:t> can display various summaries which are available at </a:t>
-            </a:r>
-            <a:r>
-              <a:rPr lang="en-US" dirty="0" err="1"/>
-              <a:t>tf.Summary</a:t>
-            </a:r>
-            <a:r>
-              <a:rPr lang="en-US" dirty="0"/>
-              <a:t> module.</a:t>
+              <a:t>Difference #2: Data Parallelism</a:t>
+            </a:r>
+          </a:p>
+          <a:p>
+            <a:r>
+              <a:rPr lang="en-US" dirty="0"/>
+              <a:t>TensorFlow allows fine tuning of every operation to be run on specific devices.</a:t>
+            </a:r>
+          </a:p>
+          <a:p>
+            <a:r>
+              <a:rPr lang="en-US" dirty="0"/>
+              <a:t>Nonetheless, achieving parallelism is more manual and requires thought.</a:t>
             </a:r>
           </a:p>
           <a:p>
@@ -9269,21 +11008,39 @@
             </a:r>
             <a:r>
               <a:rPr lang="en-US" dirty="0"/>
-              <a:t> clearly lacks a comprehensive visualization tool. </a:t>
-            </a:r>
-          </a:p>
-          <a:p>
-            <a:pPr marL="0" indent="0">
-              <a:buNone/>
-            </a:pPr>
-            <a:endParaRPr lang="en-IN" b="1" dirty="0"/>
+              <a:t> allows us to wrap any module using “</a:t>
+            </a:r>
+            <a:r>
+              <a:rPr lang="en-US" dirty="0" err="1"/>
+              <a:t>torch.nn.Dataparallel</a:t>
+            </a:r>
+            <a:r>
+              <a:rPr lang="en-US" dirty="0"/>
+              <a:t>” and it will parallelized. This is called </a:t>
+            </a:r>
+            <a:r>
+              <a:rPr lang="en-US" b="1" dirty="0"/>
+              <a:t>Declarative Data Parallelism</a:t>
+            </a:r>
+          </a:p>
+          <a:p>
+            <a:r>
+              <a:rPr lang="en-US" dirty="0"/>
+              <a:t>This way we can leverage multiple GPU’s with no effort</a:t>
+            </a:r>
+          </a:p>
+          <a:p>
+            <a:endParaRPr lang="en-US" dirty="0"/>
+          </a:p>
+          <a:p>
+            <a:endParaRPr lang="en-IN" dirty="0"/>
           </a:p>
         </p:txBody>
       </p:sp>
     </p:spTree>
     <p:extLst>
       <p:ext uri="{BB962C8B-B14F-4D97-AF65-F5344CB8AC3E}">
-        <p14:creationId xmlns:p14="http://schemas.microsoft.com/office/powerpoint/2010/main" val="1447802402"/>
+        <p14:creationId xmlns:p14="http://schemas.microsoft.com/office/powerpoint/2010/main" val="2664390709"/>
       </p:ext>
     </p:extLst>
   </p:cSld>
@@ -9315,6 +11072,238 @@
           <p:cNvPr id="3" name="Content Placeholder 2">
             <a:extLst>
               <a:ext uri="{FF2B5EF4-FFF2-40B4-BE49-F238E27FC236}">
+                <a16:creationId xmlns:a16="http://schemas.microsoft.com/office/drawing/2014/main" id="{809AE9DA-3D66-427B-825D-EF7926112F5B}"/>
+              </a:ext>
+            </a:extLst>
+          </p:cNvPr>
+          <p:cNvSpPr>
+            <a:spLocks noGrp="1"/>
+          </p:cNvSpPr>
+          <p:nvPr>
+            <p:ph idx="1"/>
+          </p:nvPr>
+        </p:nvSpPr>
+        <p:spPr>
+          <a:xfrm>
+            <a:off x="838200" y="457200"/>
+            <a:ext cx="10515600" cy="5719763"/>
+          </a:xfrm>
+        </p:spPr>
+        <p:txBody>
+          <a:bodyPr/>
+          <a:lstStyle/>
+          <a:p>
+            <a:pPr marL="0" indent="0">
+              <a:buNone/>
+            </a:pPr>
+            <a:r>
+              <a:rPr lang="en-US" b="1" dirty="0"/>
+              <a:t>Difference #3: Debugging</a:t>
+            </a:r>
+          </a:p>
+          <a:p>
+            <a:r>
+              <a:rPr lang="en-US" dirty="0"/>
+              <a:t>TensorFlow provides a special tool called “</a:t>
+            </a:r>
+            <a:r>
+              <a:rPr lang="en-US" dirty="0" err="1"/>
+              <a:t>tfdbg</a:t>
+            </a:r>
+            <a:r>
+              <a:rPr lang="en-US" dirty="0"/>
+              <a:t>” which allows to evaluate TensorFlow expressions at runtime in a specific session scope.</a:t>
+            </a:r>
+          </a:p>
+          <a:p>
+            <a:r>
+              <a:rPr lang="en-US" dirty="0"/>
+              <a:t>However, no tool is provided to debug the python code.</a:t>
+            </a:r>
+          </a:p>
+          <a:p>
+            <a:r>
+              <a:rPr lang="en-US" dirty="0"/>
+              <a:t>However, as computation graph in </a:t>
+            </a:r>
+            <a:r>
+              <a:rPr lang="en-US" dirty="0" err="1"/>
+              <a:t>PyTorch</a:t>
+            </a:r>
+            <a:r>
+              <a:rPr lang="en-US" dirty="0"/>
+              <a:t> is defined at runtime you can use any of the python debugging tools like </a:t>
+            </a:r>
+            <a:r>
+              <a:rPr lang="en-US" dirty="0" err="1"/>
+              <a:t>pdb</a:t>
+            </a:r>
+            <a:r>
+              <a:rPr lang="en-US" dirty="0"/>
+              <a:t>, </a:t>
+            </a:r>
+            <a:r>
+              <a:rPr lang="en-US" dirty="0" err="1"/>
+              <a:t>ipdb</a:t>
+            </a:r>
+            <a:r>
+              <a:rPr lang="en-US" dirty="0"/>
+              <a:t>, PyCharm debugger either.</a:t>
+            </a:r>
+          </a:p>
+          <a:p>
+            <a:pPr marL="0" indent="0">
+              <a:buNone/>
+            </a:pPr>
+            <a:endParaRPr lang="en-IN" dirty="0"/>
+          </a:p>
+        </p:txBody>
+      </p:sp>
+    </p:spTree>
+    <p:extLst>
+      <p:ext uri="{BB962C8B-B14F-4D97-AF65-F5344CB8AC3E}">
+        <p14:creationId xmlns:p14="http://schemas.microsoft.com/office/powerpoint/2010/main" val="1828502175"/>
+      </p:ext>
+    </p:extLst>
+  </p:cSld>
+  <p:clrMapOvr>
+    <a:masterClrMapping/>
+  </p:clrMapOvr>
+</p:sld>
+</file>
+
+<file path=ppt/slides/slide43.xml><?xml version="1.0" encoding="utf-8"?>
+<p:sld xmlns:a="http://schemas.openxmlformats.org/drawingml/2006/main" xmlns:r="http://schemas.openxmlformats.org/officeDocument/2006/relationships" xmlns:p="http://schemas.openxmlformats.org/presentationml/2006/main">
+  <p:cSld>
+    <p:spTree>
+      <p:nvGrpSpPr>
+        <p:cNvPr id="1" name=""/>
+        <p:cNvGrpSpPr/>
+        <p:nvPr/>
+      </p:nvGrpSpPr>
+      <p:grpSpPr>
+        <a:xfrm>
+          <a:off x="0" y="0"/>
+          <a:ext cx="0" cy="0"/>
+          <a:chOff x="0" y="0"/>
+          <a:chExt cx="0" cy="0"/>
+        </a:xfrm>
+      </p:grpSpPr>
+      <p:sp>
+        <p:nvSpPr>
+          <p:cNvPr id="3" name="Content Placeholder 2">
+            <a:extLst>
+              <a:ext uri="{FF2B5EF4-FFF2-40B4-BE49-F238E27FC236}">
+                <a16:creationId xmlns:a16="http://schemas.microsoft.com/office/drawing/2014/main" id="{24580A68-C6F0-4E51-9A88-D84BF574EA65}"/>
+              </a:ext>
+            </a:extLst>
+          </p:cNvPr>
+          <p:cNvSpPr>
+            <a:spLocks noGrp="1"/>
+          </p:cNvSpPr>
+          <p:nvPr>
+            <p:ph idx="1"/>
+          </p:nvPr>
+        </p:nvSpPr>
+        <p:spPr>
+          <a:xfrm>
+            <a:off x="838200" y="457200"/>
+            <a:ext cx="10515600" cy="5719763"/>
+          </a:xfrm>
+        </p:spPr>
+        <p:txBody>
+          <a:bodyPr/>
+          <a:lstStyle/>
+          <a:p>
+            <a:pPr marL="0" indent="0">
+              <a:buNone/>
+            </a:pPr>
+            <a:r>
+              <a:rPr lang="en-US" b="1" dirty="0"/>
+              <a:t>Difference #4: Visualization</a:t>
+            </a:r>
+          </a:p>
+          <a:p>
+            <a:r>
+              <a:rPr lang="en-US" dirty="0" err="1"/>
+              <a:t>TensorBoard</a:t>
+            </a:r>
+            <a:r>
+              <a:rPr lang="en-US" dirty="0"/>
+              <a:t>, visualization tool in TensorFlow is very useful when it comes to comparison of different training runs</a:t>
+            </a:r>
+          </a:p>
+          <a:p>
+            <a:r>
+              <a:rPr lang="en-US" dirty="0" err="1"/>
+              <a:t>TensorBoard</a:t>
+            </a:r>
+            <a:r>
+              <a:rPr lang="en-US" dirty="0"/>
+              <a:t> can display various summaries which are available at </a:t>
+            </a:r>
+            <a:r>
+              <a:rPr lang="en-US" dirty="0" err="1"/>
+              <a:t>tf.Summary</a:t>
+            </a:r>
+            <a:r>
+              <a:rPr lang="en-US" dirty="0"/>
+              <a:t> module.</a:t>
+            </a:r>
+          </a:p>
+          <a:p>
+            <a:r>
+              <a:rPr lang="en-US" dirty="0" err="1"/>
+              <a:t>PyTorch</a:t>
+            </a:r>
+            <a:r>
+              <a:rPr lang="en-US" dirty="0"/>
+              <a:t> clearly lacks a comprehensive visualization tool. </a:t>
+            </a:r>
+          </a:p>
+          <a:p>
+            <a:pPr marL="0" indent="0">
+              <a:buNone/>
+            </a:pPr>
+            <a:endParaRPr lang="en-IN" b="1" dirty="0"/>
+          </a:p>
+        </p:txBody>
+      </p:sp>
+    </p:spTree>
+    <p:extLst>
+      <p:ext uri="{BB962C8B-B14F-4D97-AF65-F5344CB8AC3E}">
+        <p14:creationId xmlns:p14="http://schemas.microsoft.com/office/powerpoint/2010/main" val="1447802402"/>
+      </p:ext>
+    </p:extLst>
+  </p:cSld>
+  <p:clrMapOvr>
+    <a:masterClrMapping/>
+  </p:clrMapOvr>
+</p:sld>
+</file>
+
+<file path=ppt/slides/slide44.xml><?xml version="1.0" encoding="utf-8"?>
+<p:sld xmlns:a="http://schemas.openxmlformats.org/drawingml/2006/main" xmlns:r="http://schemas.openxmlformats.org/officeDocument/2006/relationships" xmlns:p="http://schemas.openxmlformats.org/presentationml/2006/main">
+  <p:cSld>
+    <p:spTree>
+      <p:nvGrpSpPr>
+        <p:cNvPr id="1" name=""/>
+        <p:cNvGrpSpPr/>
+        <p:nvPr/>
+      </p:nvGrpSpPr>
+      <p:grpSpPr>
+        <a:xfrm>
+          <a:off x="0" y="0"/>
+          <a:ext cx="0" cy="0"/>
+          <a:chOff x="0" y="0"/>
+          <a:chExt cx="0" cy="0"/>
+        </a:xfrm>
+      </p:grpSpPr>
+      <p:sp>
+        <p:nvSpPr>
+          <p:cNvPr id="3" name="Content Placeholder 2">
+            <a:extLst>
+              <a:ext uri="{FF2B5EF4-FFF2-40B4-BE49-F238E27FC236}">
                 <a16:creationId xmlns:a16="http://schemas.microsoft.com/office/drawing/2014/main" id="{63ABB4C9-C20F-41F7-A5BF-32CD811693C2}"/>
               </a:ext>
             </a:extLst>
@@ -9406,7 +11395,7 @@
 </p:sld>
 </file>
 
-<file path=ppt/slides/slide43.xml><?xml version="1.0" encoding="utf-8"?>
+<file path=ppt/slides/slide45.xml><?xml version="1.0" encoding="utf-8"?>
 <p:sld xmlns:a="http://schemas.openxmlformats.org/drawingml/2006/main" xmlns:r="http://schemas.openxmlformats.org/officeDocument/2006/relationships" xmlns:p="http://schemas.openxmlformats.org/presentationml/2006/main">
   <p:cSld>
     <p:spTree>
@@ -10175,7 +12164,7 @@
 </p:sld>
 </file>
 
-<file path=ppt/slides/slide44.xml><?xml version="1.0" encoding="utf-8"?>
+<file path=ppt/slides/slide46.xml><?xml version="1.0" encoding="utf-8"?>
 <p:sld xmlns:a="http://schemas.openxmlformats.org/drawingml/2006/main" xmlns:r="http://schemas.openxmlformats.org/officeDocument/2006/relationships" xmlns:p="http://schemas.openxmlformats.org/presentationml/2006/main">
   <p:cSld>
     <p:spTree>
@@ -10344,7 +12333,7 @@
 </p:sld>
 </file>
 
-<file path=ppt/slides/slide45.xml><?xml version="1.0" encoding="utf-8"?>
+<file path=ppt/slides/slide47.xml><?xml version="1.0" encoding="utf-8"?>
 <p:sld xmlns:a="http://schemas.openxmlformats.org/drawingml/2006/main" xmlns:r="http://schemas.openxmlformats.org/officeDocument/2006/relationships" xmlns:p="http://schemas.openxmlformats.org/presentationml/2006/main">
   <p:cSld>
     <p:spTree>
@@ -10441,7 +12430,7 @@
 </p:sld>
 </file>
 
-<file path=ppt/slides/slide46.xml><?xml version="1.0" encoding="utf-8"?>
+<file path=ppt/slides/slide48.xml><?xml version="1.0" encoding="utf-8"?>
 <p:sld xmlns:a="http://schemas.openxmlformats.org/drawingml/2006/main" xmlns:r="http://schemas.openxmlformats.org/officeDocument/2006/relationships" xmlns:p="http://schemas.openxmlformats.org/presentationml/2006/main">
   <p:cSld>
     <p:spTree>
@@ -10937,8 +12926,8 @@
           </a:p>
         </p:txBody>
       </p:sp>
-      <mc:AlternateContent xmlns:mc="http://schemas.openxmlformats.org/markup-compatibility/2006" xmlns:a14="http://schemas.microsoft.com/office/drawing/2010/main">
-        <mc:Choice Requires="a14">
+      <mc:AlternateContent xmlns:mc="http://schemas.openxmlformats.org/markup-compatibility/2006">
+        <mc:Choice xmlns:a14="http://schemas.microsoft.com/office/drawing/2010/main" Requires="a14">
           <p:sp>
             <p:nvSpPr>
               <p:cNvPr id="3" name="Content Placeholder 2">
@@ -10963,7 +12952,7 @@
             </p:spPr>
             <p:txBody>
               <a:bodyPr>
-                <a:normAutofit fontScale="92500" lnSpcReduction="10000"/>
+                <a:normAutofit fontScale="92500"/>
               </a:bodyPr>
               <a:lstStyle/>
               <a:p>
@@ -10975,14 +12964,16 @@
               <a:p>
                 <a:r>
                   <a:rPr lang="en-US" dirty="0"/>
-                  <a:t>Computation graph is a simple data structure that allows us to efficiently apply chain rule to compute gradients</a:t>
+                  <a:t>Computation graph is a simple data structure that allows us to efficiently apply </a:t>
                 </a:r>
-              </a:p>
-              <a:p>
-                <a:pPr marL="0" indent="0">
-                  <a:buNone/>
-                </a:pPr>
-                <a:endParaRPr lang="en-US" dirty="0"/>
+                <a:r>
+                  <a:rPr lang="en-US" b="1" dirty="0"/>
+                  <a:t>chain rule</a:t>
+                </a:r>
+                <a:r>
+                  <a:rPr lang="en-US" dirty="0"/>
+                  <a:t> to compute gradients</a:t>
+                </a:r>
               </a:p>
               <a:p>
                 <a:r>
@@ -11242,7 +13233,7 @@
             </p:txBody>
           </p:sp>
         </mc:Choice>
-        <mc:Fallback xmlns="">
+        <mc:Fallback>
           <p:sp>
             <p:nvSpPr>
               <p:cNvPr id="3" name="Content Placeholder 2">
@@ -11267,7 +13258,7 @@
               <a:blipFill>
                 <a:blip r:embed="rId2"/>
                 <a:stretch>
-                  <a:fillRect l="-928" t="-2475"/>
+                  <a:fillRect l="-928" t="-1856"/>
                 </a:stretch>
               </a:blipFill>
             </p:spPr>

</xml_diff>